<commit_message>
updated EPN design with nearest exit look-up Global State Element
</commit_message>
<xml_diff>
--- a/reports/EPN Design.pptx
+++ b/reports/EPN Design.pptx
@@ -246,7 +246,7 @@
           <a:p>
             <a:fld id="{A1D40FD7-A18D-4BE2-A83E-A57FF66F1A38}" type="datetimeFigureOut">
               <a:rPr lang="en-SG" smtClean="0"/>
-              <a:t>5/11/2016</a:t>
+              <a:t>8/11/2016</a:t>
             </a:fld>
             <a:endParaRPr lang="en-SG"/>
           </a:p>
@@ -416,7 +416,7 @@
           <a:p>
             <a:fld id="{A1D40FD7-A18D-4BE2-A83E-A57FF66F1A38}" type="datetimeFigureOut">
               <a:rPr lang="en-SG" smtClean="0"/>
-              <a:t>5/11/2016</a:t>
+              <a:t>8/11/2016</a:t>
             </a:fld>
             <a:endParaRPr lang="en-SG"/>
           </a:p>
@@ -596,7 +596,7 @@
           <a:p>
             <a:fld id="{A1D40FD7-A18D-4BE2-A83E-A57FF66F1A38}" type="datetimeFigureOut">
               <a:rPr lang="en-SG" smtClean="0"/>
-              <a:t>5/11/2016</a:t>
+              <a:t>8/11/2016</a:t>
             </a:fld>
             <a:endParaRPr lang="en-SG"/>
           </a:p>
@@ -766,7 +766,7 @@
           <a:p>
             <a:fld id="{A1D40FD7-A18D-4BE2-A83E-A57FF66F1A38}" type="datetimeFigureOut">
               <a:rPr lang="en-SG" smtClean="0"/>
-              <a:t>5/11/2016</a:t>
+              <a:t>8/11/2016</a:t>
             </a:fld>
             <a:endParaRPr lang="en-SG"/>
           </a:p>
@@ -1012,7 +1012,7 @@
           <a:p>
             <a:fld id="{A1D40FD7-A18D-4BE2-A83E-A57FF66F1A38}" type="datetimeFigureOut">
               <a:rPr lang="en-SG" smtClean="0"/>
-              <a:t>5/11/2016</a:t>
+              <a:t>8/11/2016</a:t>
             </a:fld>
             <a:endParaRPr lang="en-SG"/>
           </a:p>
@@ -1244,7 +1244,7 @@
           <a:p>
             <a:fld id="{A1D40FD7-A18D-4BE2-A83E-A57FF66F1A38}" type="datetimeFigureOut">
               <a:rPr lang="en-SG" smtClean="0"/>
-              <a:t>5/11/2016</a:t>
+              <a:t>8/11/2016</a:t>
             </a:fld>
             <a:endParaRPr lang="en-SG"/>
           </a:p>
@@ -1611,7 +1611,7 @@
           <a:p>
             <a:fld id="{A1D40FD7-A18D-4BE2-A83E-A57FF66F1A38}" type="datetimeFigureOut">
               <a:rPr lang="en-SG" smtClean="0"/>
-              <a:t>5/11/2016</a:t>
+              <a:t>8/11/2016</a:t>
             </a:fld>
             <a:endParaRPr lang="en-SG"/>
           </a:p>
@@ -1729,7 +1729,7 @@
           <a:p>
             <a:fld id="{A1D40FD7-A18D-4BE2-A83E-A57FF66F1A38}" type="datetimeFigureOut">
               <a:rPr lang="en-SG" smtClean="0"/>
-              <a:t>5/11/2016</a:t>
+              <a:t>8/11/2016</a:t>
             </a:fld>
             <a:endParaRPr lang="en-SG"/>
           </a:p>
@@ -1824,7 +1824,7 @@
           <a:p>
             <a:fld id="{A1D40FD7-A18D-4BE2-A83E-A57FF66F1A38}" type="datetimeFigureOut">
               <a:rPr lang="en-SG" smtClean="0"/>
-              <a:t>5/11/2016</a:t>
+              <a:t>8/11/2016</a:t>
             </a:fld>
             <a:endParaRPr lang="en-SG"/>
           </a:p>
@@ -2101,7 +2101,7 @@
           <a:p>
             <a:fld id="{A1D40FD7-A18D-4BE2-A83E-A57FF66F1A38}" type="datetimeFigureOut">
               <a:rPr lang="en-SG" smtClean="0"/>
-              <a:t>5/11/2016</a:t>
+              <a:t>8/11/2016</a:t>
             </a:fld>
             <a:endParaRPr lang="en-SG"/>
           </a:p>
@@ -2354,7 +2354,7 @@
           <a:p>
             <a:fld id="{A1D40FD7-A18D-4BE2-A83E-A57FF66F1A38}" type="datetimeFigureOut">
               <a:rPr lang="en-SG" smtClean="0"/>
-              <a:t>5/11/2016</a:t>
+              <a:t>8/11/2016</a:t>
             </a:fld>
             <a:endParaRPr lang="en-SG"/>
           </a:p>
@@ -2567,7 +2567,7 @@
           <a:p>
             <a:fld id="{A1D40FD7-A18D-4BE2-A83E-A57FF66F1A38}" type="datetimeFigureOut">
               <a:rPr lang="en-SG" smtClean="0"/>
-              <a:t>5/11/2016</a:t>
+              <a:t>8/11/2016</a:t>
             </a:fld>
             <a:endParaRPr lang="en-SG"/>
           </a:p>
@@ -3040,6 +3040,21 @@
               <a:t>Anticipate congestion based upon forecasts of inclement weather</a:t>
             </a:r>
           </a:p>
+          <a:p>
+            <a:pPr marL="514350" indent="-514350">
+              <a:buFont typeface="+mj-lt"/>
+              <a:buAutoNum type="arabicPeriod"/>
+            </a:pPr>
+            <a:r>
+              <a:rPr lang="en-US" dirty="0"/>
+              <a:t>Look-up the </a:t>
+            </a:r>
+            <a:r>
+              <a:rPr lang="en-US"/>
+              <a:t>closest alternative exit</a:t>
+            </a:r>
+            <a:endParaRPr lang="en-US" dirty="0"/>
+          </a:p>
         </p:txBody>
       </p:sp>
     </p:spTree>
@@ -3080,7 +3095,7 @@
         </p:nvSpPr>
         <p:spPr>
           <a:xfrm>
-            <a:off x="508582" y="963153"/>
+            <a:off x="577449" y="504957"/>
             <a:ext cx="1038554" cy="369332"/>
           </a:xfrm>
           <a:prstGeom prst="rect">
@@ -3110,7 +3125,7 @@
         </p:nvSpPr>
         <p:spPr>
           <a:xfrm>
-            <a:off x="10352165" y="844808"/>
+            <a:off x="10393336" y="504957"/>
             <a:ext cx="1143262" cy="369332"/>
           </a:xfrm>
           <a:prstGeom prst="rect">
@@ -3140,7 +3155,7 @@
         </p:nvSpPr>
         <p:spPr>
           <a:xfrm>
-            <a:off x="508582" y="2055102"/>
+            <a:off x="567872" y="2055070"/>
             <a:ext cx="1068920" cy="566057"/>
           </a:xfrm>
           <a:prstGeom prst="roundRect">
@@ -3181,7 +3196,7 @@
         </p:nvSpPr>
         <p:spPr>
           <a:xfrm rot="5400000">
-            <a:off x="1464290" y="2245686"/>
+            <a:off x="1523580" y="2245654"/>
             <a:ext cx="226423" cy="184888"/>
           </a:xfrm>
           <a:prstGeom prst="triangle">
@@ -3224,7 +3239,7 @@
         </p:nvSpPr>
         <p:spPr>
           <a:xfrm>
-            <a:off x="508582" y="2055102"/>
+            <a:off x="567872" y="2055070"/>
             <a:ext cx="338554" cy="215444"/>
           </a:xfrm>
           <a:prstGeom prst="rect">
@@ -3254,7 +3269,7 @@
         </p:nvSpPr>
         <p:spPr>
           <a:xfrm>
-            <a:off x="534729" y="2224918"/>
+            <a:off x="594019" y="2224886"/>
             <a:ext cx="950327" cy="400110"/>
           </a:xfrm>
           <a:prstGeom prst="rect">
@@ -3803,7 +3818,7 @@
         <p:spPr>
           <a:xfrm>
             <a:off x="7292010" y="1390098"/>
-            <a:ext cx="1387040" cy="369332"/>
+            <a:ext cx="1387040" cy="507831"/>
           </a:xfrm>
           <a:prstGeom prst="rect">
             <a:avLst/>
@@ -3824,6 +3839,14 @@
               <a:rPr lang="en-US" sz="900" dirty="0" err="1"/>
               <a:t>RoadName</a:t>
             </a:r>
+            <a:r>
+              <a:rPr lang="en-US" sz="900" dirty="0"/>
+              <a:t>”  exit at </a:t>
+            </a:r>
+            <a:r>
+              <a:rPr lang="en-US" sz="900" dirty="0" err="1"/>
+              <a:t>AlternativeRoad</a:t>
+            </a:r>
             <a:endParaRPr lang="en-SG" sz="900" dirty="0"/>
           </a:p>
         </p:txBody>
@@ -3866,7 +3889,7 @@
         </p:nvSpPr>
         <p:spPr>
           <a:xfrm>
-            <a:off x="562179" y="3825778"/>
+            <a:off x="562179" y="3686434"/>
             <a:ext cx="1068920" cy="566057"/>
           </a:xfrm>
           <a:prstGeom prst="roundRect">
@@ -3907,7 +3930,7 @@
         </p:nvSpPr>
         <p:spPr>
           <a:xfrm rot="5400000">
-            <a:off x="1517887" y="4016362"/>
+            <a:off x="1517887" y="3877018"/>
             <a:ext cx="226423" cy="184888"/>
           </a:xfrm>
           <a:prstGeom prst="triangle">
@@ -3950,7 +3973,7 @@
         </p:nvSpPr>
         <p:spPr>
           <a:xfrm>
-            <a:off x="562179" y="3825778"/>
+            <a:off x="562179" y="3686434"/>
             <a:ext cx="338554" cy="215444"/>
           </a:xfrm>
           <a:prstGeom prst="rect">
@@ -3980,7 +4003,7 @@
         </p:nvSpPr>
         <p:spPr>
           <a:xfrm>
-            <a:off x="588326" y="3995594"/>
+            <a:off x="588326" y="3856250"/>
             <a:ext cx="950327" cy="400110"/>
           </a:xfrm>
           <a:prstGeom prst="rect">
@@ -4015,7 +4038,7 @@
         <p:spPr>
           <a:xfrm>
             <a:off x="7350368" y="2485574"/>
-            <a:ext cx="1326513" cy="507831"/>
+            <a:ext cx="1384685" cy="507831"/>
           </a:xfrm>
           <a:prstGeom prst="rect">
             <a:avLst/>
@@ -4037,8 +4060,13 @@
             </a:r>
             <a:r>
               <a:rPr lang="en-SG" sz="900" dirty="0"/>
-              <a:t>. “Consider alternatives”</a:t>
-            </a:r>
+              <a:t>. “exit at” </a:t>
+            </a:r>
+            <a:r>
+              <a:rPr lang="en-SG" sz="900" dirty="0" err="1"/>
+              <a:t>AlternativeRoad</a:t>
+            </a:r>
+            <a:endParaRPr lang="en-SG" sz="900" dirty="0"/>
           </a:p>
         </p:txBody>
       </p:sp>
@@ -4088,13 +4116,12 @@
           <p:cNvPr id="57" name="Straight Connector 56"/>
           <p:cNvCxnSpPr>
             <a:stCxn id="8" idx="0"/>
-            <a:endCxn id="55" idx="3"/>
           </p:cNvCxnSpPr>
           <p:nvPr/>
         </p:nvCxnSpPr>
         <p:spPr>
           <a:xfrm>
-            <a:off x="1669946" y="2338131"/>
+            <a:off x="1729236" y="2338099"/>
             <a:ext cx="290614" cy="1895"/>
           </a:xfrm>
           <a:prstGeom prst="line">
@@ -5139,7 +5166,7 @@
         </p:nvCxnSpPr>
         <p:spPr>
           <a:xfrm>
-            <a:off x="1723543" y="4108807"/>
+            <a:off x="1723543" y="3969463"/>
             <a:ext cx="1986507" cy="6293"/>
           </a:xfrm>
           <a:prstGeom prst="line">
@@ -5169,7 +5196,7 @@
         </p:nvSpPr>
         <p:spPr>
           <a:xfrm>
-            <a:off x="3768589" y="3488003"/>
+            <a:off x="3768589" y="3348659"/>
             <a:ext cx="1632857" cy="885894"/>
           </a:xfrm>
           <a:prstGeom prst="roundRect">
@@ -5210,7 +5237,7 @@
         </p:nvSpPr>
         <p:spPr>
           <a:xfrm>
-            <a:off x="3816752" y="3534282"/>
+            <a:off x="3816752" y="3394938"/>
             <a:ext cx="1117614" cy="215444"/>
           </a:xfrm>
           <a:prstGeom prst="rect">
@@ -5240,7 +5267,7 @@
         </p:nvSpPr>
         <p:spPr>
           <a:xfrm rot="5400000">
-            <a:off x="3689282" y="4022655"/>
+            <a:off x="3689282" y="3883311"/>
             <a:ext cx="226423" cy="184888"/>
           </a:xfrm>
           <a:prstGeom prst="triangle">
@@ -5283,7 +5310,7 @@
         </p:nvSpPr>
         <p:spPr>
           <a:xfrm rot="5400000">
-            <a:off x="5332850" y="3641488"/>
+            <a:off x="5332850" y="3502144"/>
             <a:ext cx="226423" cy="184888"/>
           </a:xfrm>
           <a:prstGeom prst="triangle">
@@ -5326,7 +5353,7 @@
         </p:nvSpPr>
         <p:spPr>
           <a:xfrm rot="5400000">
-            <a:off x="5339430" y="4055464"/>
+            <a:off x="5339430" y="3916120"/>
             <a:ext cx="226423" cy="184888"/>
           </a:xfrm>
           <a:prstGeom prst="triangle">
@@ -5369,7 +5396,7 @@
         </p:nvSpPr>
         <p:spPr>
           <a:xfrm>
-            <a:off x="5436692" y="3518105"/>
+            <a:off x="5436692" y="3378761"/>
             <a:ext cx="482824" cy="215444"/>
           </a:xfrm>
           <a:prstGeom prst="rect">
@@ -5399,7 +5426,7 @@
         </p:nvSpPr>
         <p:spPr>
           <a:xfrm>
-            <a:off x="5431389" y="4178778"/>
+            <a:off x="5431389" y="4039434"/>
             <a:ext cx="716863" cy="215444"/>
           </a:xfrm>
           <a:prstGeom prst="rect">
@@ -5429,7 +5456,7 @@
         </p:nvSpPr>
         <p:spPr>
           <a:xfrm>
-            <a:off x="3887032" y="3718162"/>
+            <a:off x="3887032" y="3578818"/>
             <a:ext cx="1722405" cy="507831"/>
           </a:xfrm>
           <a:prstGeom prst="rect">
@@ -5469,7 +5496,7 @@
         </p:nvSpPr>
         <p:spPr>
           <a:xfrm rot="5400000">
-            <a:off x="3671979" y="3621224"/>
+            <a:off x="3671979" y="3481880"/>
             <a:ext cx="226423" cy="184888"/>
           </a:xfrm>
           <a:prstGeom prst="triangle">
@@ -5516,11 +5543,11 @@
         <p:spPr>
           <a:xfrm>
             <a:off x="2735503" y="2340026"/>
-            <a:ext cx="957244" cy="1373643"/>
+            <a:ext cx="957244" cy="1234299"/>
           </a:xfrm>
           <a:prstGeom prst="bentConnector3">
             <a:avLst>
-              <a:gd name="adj1" fmla="val 51819"/>
+              <a:gd name="adj1" fmla="val 50000"/>
             </a:avLst>
           </a:prstGeom>
         </p:spPr>
@@ -5547,7 +5574,7 @@
         </p:nvSpPr>
         <p:spPr>
           <a:xfrm>
-            <a:off x="7364142" y="3769275"/>
+            <a:off x="7364142" y="3629931"/>
             <a:ext cx="1326513" cy="507831"/>
           </a:xfrm>
           <a:prstGeom prst="rect">
@@ -5575,7 +5602,7 @@
         </p:nvSpPr>
         <p:spPr>
           <a:xfrm>
-            <a:off x="7253707" y="3544742"/>
+            <a:off x="7253707" y="3405398"/>
             <a:ext cx="1632857" cy="885894"/>
           </a:xfrm>
           <a:prstGeom prst="roundRect">
@@ -5616,7 +5643,7 @@
         </p:nvSpPr>
         <p:spPr>
           <a:xfrm rot="5400000">
-            <a:off x="8820506" y="3622114"/>
+            <a:off x="8820506" y="3482770"/>
             <a:ext cx="226423" cy="184888"/>
           </a:xfrm>
           <a:prstGeom prst="triangle">
@@ -5659,7 +5686,7 @@
         </p:nvSpPr>
         <p:spPr>
           <a:xfrm>
-            <a:off x="7253708" y="3544742"/>
+            <a:off x="7253708" y="3405398"/>
             <a:ext cx="835485" cy="215444"/>
           </a:xfrm>
           <a:prstGeom prst="rect">
@@ -5675,7 +5702,7 @@
           <a:p>
             <a:r>
               <a:rPr lang="en-US" sz="800" dirty="0"/>
-              <a:t>EPA6: Translate</a:t>
+              <a:t>EPA7: Translate</a:t>
             </a:r>
             <a:endParaRPr lang="en-SG" sz="800" dirty="0"/>
           </a:p>
@@ -5689,7 +5716,7 @@
         </p:nvSpPr>
         <p:spPr>
           <a:xfrm rot="5400000">
-            <a:off x="8820505" y="4117617"/>
+            <a:off x="8820505" y="3978273"/>
             <a:ext cx="226423" cy="184888"/>
           </a:xfrm>
           <a:prstGeom prst="triangle">
@@ -5732,7 +5759,7 @@
         </p:nvSpPr>
         <p:spPr>
           <a:xfrm rot="5400000">
-            <a:off x="7175636" y="3648241"/>
+            <a:off x="7175636" y="3508897"/>
             <a:ext cx="226423" cy="184888"/>
           </a:xfrm>
           <a:prstGeom prst="triangle">
@@ -5775,7 +5802,7 @@
         </p:nvSpPr>
         <p:spPr>
           <a:xfrm>
-            <a:off x="8897382" y="4231952"/>
+            <a:off x="8897382" y="4092608"/>
             <a:ext cx="470000" cy="215444"/>
           </a:xfrm>
           <a:prstGeom prst="rect">
@@ -5805,7 +5832,7 @@
         </p:nvSpPr>
         <p:spPr>
           <a:xfrm>
-            <a:off x="8901864" y="3507911"/>
+            <a:off x="8901864" y="3368567"/>
             <a:ext cx="482824" cy="215444"/>
           </a:xfrm>
           <a:prstGeom prst="rect">
@@ -5838,7 +5865,7 @@
         </p:nvCxnSpPr>
         <p:spPr>
           <a:xfrm>
-            <a:off x="5538506" y="3733933"/>
+            <a:off x="5538506" y="3594589"/>
             <a:ext cx="1657898" cy="6753"/>
           </a:xfrm>
           <a:prstGeom prst="line">
@@ -5868,7 +5895,7 @@
         </p:nvSpPr>
         <p:spPr>
           <a:xfrm>
-            <a:off x="601026" y="5548940"/>
+            <a:off x="566367" y="5552714"/>
             <a:ext cx="1068920" cy="566057"/>
           </a:xfrm>
           <a:prstGeom prst="roundRect">
@@ -5909,7 +5936,7 @@
         </p:nvSpPr>
         <p:spPr>
           <a:xfrm rot="5400000">
-            <a:off x="1556734" y="5739524"/>
+            <a:off x="1522075" y="5743298"/>
             <a:ext cx="226423" cy="184888"/>
           </a:xfrm>
           <a:prstGeom prst="triangle">
@@ -5952,7 +5979,7 @@
         </p:nvSpPr>
         <p:spPr>
           <a:xfrm>
-            <a:off x="601026" y="5548940"/>
+            <a:off x="566367" y="5552714"/>
             <a:ext cx="338554" cy="215444"/>
           </a:xfrm>
           <a:prstGeom prst="rect">
@@ -5982,7 +6009,7 @@
         </p:nvSpPr>
         <p:spPr>
           <a:xfrm>
-            <a:off x="627173" y="5718756"/>
+            <a:off x="592514" y="5722530"/>
             <a:ext cx="1016625" cy="246221"/>
           </a:xfrm>
           <a:prstGeom prst="rect">
@@ -6015,8 +6042,8 @@
         </p:nvCxnSpPr>
         <p:spPr>
           <a:xfrm>
-            <a:off x="1762390" y="5831969"/>
-            <a:ext cx="1930357" cy="17743"/>
+            <a:off x="1727731" y="5835743"/>
+            <a:ext cx="1965016" cy="13969"/>
           </a:xfrm>
           <a:prstGeom prst="line">
             <a:avLst/>
@@ -6102,7 +6129,7 @@
           <a:p>
             <a:r>
               <a:rPr lang="en-US" sz="800" dirty="0"/>
-              <a:t>EPA3: Filter</a:t>
+              <a:t>EPA4: Filter</a:t>
             </a:r>
             <a:endParaRPr lang="en-SG" sz="800" dirty="0"/>
           </a:p>
@@ -6549,7 +6576,7 @@
           <a:p>
             <a:r>
               <a:rPr lang="en-US" sz="800" dirty="0"/>
-              <a:t>EPA6: Translate</a:t>
+              <a:t>EPA8: Translate</a:t>
             </a:r>
             <a:endParaRPr lang="en-SG" sz="800" dirty="0"/>
           </a:p>
@@ -6770,8 +6797,8 @@
         </p:nvSpPr>
         <p:spPr>
           <a:xfrm>
-            <a:off x="2246811" y="4787056"/>
-            <a:ext cx="6959246" cy="646331"/>
+            <a:off x="2292751" y="5161830"/>
+            <a:ext cx="6959246" cy="276999"/>
           </a:xfrm>
           <a:prstGeom prst="rect">
             <a:avLst/>
@@ -6784,10 +6811,9 @@
           <a:lstStyle/>
           <a:p>
             <a:r>
-              <a:rPr lang="en-SG" dirty="0"/>
+              <a:rPr lang="en-SG" sz="1200" dirty="0"/>
               <a:t>Event Processing Network triggers the necessary assistance needed if there is an accident on the road.</a:t>
             </a:r>
-            <a:endParaRPr lang="en-SG" dirty="0"/>
           </a:p>
         </p:txBody>
       </p:sp>
@@ -6799,8 +6825,8 @@
         </p:nvSpPr>
         <p:spPr>
           <a:xfrm>
-            <a:off x="2064052" y="227958"/>
-            <a:ext cx="8545209" cy="646331"/>
+            <a:off x="1485056" y="227958"/>
+            <a:ext cx="9124205" cy="276999"/>
           </a:xfrm>
           <a:prstGeom prst="rect">
             <a:avLst/>
@@ -6813,13 +6839,169 @@
           <a:lstStyle/>
           <a:p>
             <a:r>
-              <a:rPr lang="en-SG" dirty="0"/>
+              <a:rPr lang="en-SG" sz="1200" dirty="0"/>
               <a:t>Event Processing Network triggers the messages at each of the individual arterial roads so as to improve road conditions at major expressways.</a:t>
             </a:r>
-            <a:endParaRPr lang="en-SG" dirty="0"/>
-          </a:p>
-        </p:txBody>
-      </p:sp>
+          </a:p>
+        </p:txBody>
+      </p:sp>
+      <p:sp>
+        <p:nvSpPr>
+          <p:cNvPr id="110" name="Cylinder 109"/>
+          <p:cNvSpPr/>
+          <p:nvPr/>
+        </p:nvSpPr>
+        <p:spPr>
+          <a:xfrm>
+            <a:off x="6206188" y="4196890"/>
+            <a:ext cx="615863" cy="804643"/>
+          </a:xfrm>
+          <a:prstGeom prst="can">
+            <a:avLst/>
+          </a:prstGeom>
+          <a:noFill/>
+        </p:spPr>
+        <p:style>
+          <a:lnRef idx="2">
+            <a:schemeClr val="accent1">
+              <a:shade val="50000"/>
+            </a:schemeClr>
+          </a:lnRef>
+          <a:fillRef idx="1">
+            <a:schemeClr val="accent1"/>
+          </a:fillRef>
+          <a:effectRef idx="0">
+            <a:schemeClr val="accent1"/>
+          </a:effectRef>
+          <a:fontRef idx="minor">
+            <a:schemeClr val="lt1"/>
+          </a:fontRef>
+        </p:style>
+        <p:txBody>
+          <a:bodyPr rtlCol="0" anchor="ctr"/>
+          <a:lstStyle/>
+          <a:p>
+            <a:pPr algn="ctr"/>
+            <a:endParaRPr lang="en-SG"/>
+          </a:p>
+        </p:txBody>
+      </p:sp>
+      <p:sp>
+        <p:nvSpPr>
+          <p:cNvPr id="111" name="TextBox 110"/>
+          <p:cNvSpPr txBox="1"/>
+          <p:nvPr/>
+        </p:nvSpPr>
+        <p:spPr>
+          <a:xfrm>
+            <a:off x="6191750" y="4379328"/>
+            <a:ext cx="630301" cy="461665"/>
+          </a:xfrm>
+          <a:prstGeom prst="rect">
+            <a:avLst/>
+          </a:prstGeom>
+          <a:noFill/>
+        </p:spPr>
+        <p:txBody>
+          <a:bodyPr wrap="none" rtlCol="0">
+            <a:spAutoFit/>
+          </a:bodyPr>
+          <a:lstStyle/>
+          <a:p>
+            <a:r>
+              <a:rPr lang="en-US" sz="800" dirty="0"/>
+              <a:t>Singapore</a:t>
+            </a:r>
+          </a:p>
+          <a:p>
+            <a:r>
+              <a:rPr lang="en-US" sz="800" dirty="0"/>
+              <a:t>Geospatial</a:t>
+            </a:r>
+          </a:p>
+          <a:p>
+            <a:r>
+              <a:rPr lang="en-US" sz="800" dirty="0"/>
+              <a:t>Database</a:t>
+            </a:r>
+            <a:endParaRPr lang="en-SG" sz="800" dirty="0"/>
+          </a:p>
+        </p:txBody>
+      </p:sp>
+      <p:cxnSp>
+        <p:nvCxnSpPr>
+          <p:cNvPr id="16" name="Connector: Elbow 15"/>
+          <p:cNvCxnSpPr>
+            <a:stCxn id="110" idx="0"/>
+            <a:endCxn id="73" idx="1"/>
+          </p:cNvCxnSpPr>
+          <p:nvPr/>
+        </p:nvCxnSpPr>
+        <p:spPr>
+          <a:xfrm rot="5400000" flipH="1" flipV="1">
+            <a:off x="6053592" y="3164516"/>
+            <a:ext cx="1646868" cy="725813"/>
+          </a:xfrm>
+          <a:prstGeom prst="bentConnector2">
+            <a:avLst/>
+          </a:prstGeom>
+          <a:ln>
+            <a:prstDash val="dash"/>
+            <a:tailEnd type="triangle"/>
+          </a:ln>
+        </p:spPr>
+        <p:style>
+          <a:lnRef idx="1">
+            <a:schemeClr val="accent1"/>
+          </a:lnRef>
+          <a:fillRef idx="0">
+            <a:schemeClr val="accent1"/>
+          </a:fillRef>
+          <a:effectRef idx="0">
+            <a:schemeClr val="accent1"/>
+          </a:effectRef>
+          <a:fontRef idx="minor">
+            <a:schemeClr val="tx1"/>
+          </a:fontRef>
+        </p:style>
+      </p:cxnSp>
+      <p:cxnSp>
+        <p:nvCxnSpPr>
+          <p:cNvPr id="22" name="Connector: Elbow 21"/>
+          <p:cNvCxnSpPr>
+            <a:stCxn id="110" idx="0"/>
+            <a:endCxn id="27" idx="1"/>
+          </p:cNvCxnSpPr>
+          <p:nvPr/>
+        </p:nvCxnSpPr>
+        <p:spPr>
+          <a:xfrm rot="5400000" flipH="1" flipV="1">
+            <a:off x="5465598" y="2597888"/>
+            <a:ext cx="2801491" cy="704447"/>
+          </a:xfrm>
+          <a:prstGeom prst="bentConnector2">
+            <a:avLst/>
+          </a:prstGeom>
+          <a:ln>
+            <a:prstDash val="dash"/>
+            <a:tailEnd type="triangle"/>
+          </a:ln>
+        </p:spPr>
+        <p:style>
+          <a:lnRef idx="1">
+            <a:schemeClr val="accent1"/>
+          </a:lnRef>
+          <a:fillRef idx="0">
+            <a:schemeClr val="accent1"/>
+          </a:fillRef>
+          <a:effectRef idx="0">
+            <a:schemeClr val="accent1"/>
+          </a:effectRef>
+          <a:fontRef idx="minor">
+            <a:schemeClr val="tx1"/>
+          </a:fontRef>
+        </p:style>
+      </p:cxnSp>
     </p:spTree>
     <p:extLst>
       <p:ext uri="{BB962C8B-B14F-4D97-AF65-F5344CB8AC3E}">

</xml_diff>

<commit_message>
edits to EPN Design
</commit_message>
<xml_diff>
--- a/reports/EPN Design.pptx
+++ b/reports/EPN Design.pptx
@@ -3155,7 +3155,7 @@
         </p:nvSpPr>
         <p:spPr>
           <a:xfrm>
-            <a:off x="567872" y="2055070"/>
+            <a:off x="567872" y="1907019"/>
             <a:ext cx="1068920" cy="566057"/>
           </a:xfrm>
           <a:prstGeom prst="roundRect">
@@ -3196,7 +3196,7 @@
         </p:nvSpPr>
         <p:spPr>
           <a:xfrm rot="5400000">
-            <a:off x="1523580" y="2245654"/>
+            <a:off x="1523580" y="2097603"/>
             <a:ext cx="226423" cy="184888"/>
           </a:xfrm>
           <a:prstGeom prst="triangle">
@@ -3239,7 +3239,7 @@
         </p:nvSpPr>
         <p:spPr>
           <a:xfrm>
-            <a:off x="567872" y="2055070"/>
+            <a:off x="567872" y="1907019"/>
             <a:ext cx="338554" cy="215444"/>
           </a:xfrm>
           <a:prstGeom prst="rect">
@@ -3254,7 +3254,7 @@
           <a:lstStyle/>
           <a:p>
             <a:r>
-              <a:rPr lang="en-US" sz="800" dirty="0" smtClean="0"/>
+              <a:rPr lang="en-US" sz="800" dirty="0"/>
               <a:t>EP2</a:t>
             </a:r>
             <a:endParaRPr lang="en-SG" sz="800" dirty="0"/>
@@ -3269,7 +3269,7 @@
         </p:nvSpPr>
         <p:spPr>
           <a:xfrm>
-            <a:off x="594019" y="2224886"/>
+            <a:off x="594019" y="2076835"/>
             <a:ext cx="950327" cy="400110"/>
           </a:xfrm>
           <a:prstGeom prst="rect">
@@ -3441,7 +3441,7 @@
         </p:nvSpPr>
         <p:spPr>
           <a:xfrm>
-            <a:off x="3779769" y="944647"/>
+            <a:off x="3779769" y="796596"/>
             <a:ext cx="1632857" cy="870525"/>
           </a:xfrm>
           <a:prstGeom prst="roundRect">
@@ -3482,7 +3482,7 @@
         </p:nvSpPr>
         <p:spPr>
           <a:xfrm>
-            <a:off x="3778338" y="940074"/>
+            <a:off x="3778338" y="792023"/>
             <a:ext cx="1236236" cy="215444"/>
           </a:xfrm>
           <a:prstGeom prst="rect">
@@ -3512,7 +3512,7 @@
         </p:nvSpPr>
         <p:spPr>
           <a:xfrm rot="5400000">
-            <a:off x="3692705" y="1182041"/>
+            <a:off x="3692705" y="1033990"/>
             <a:ext cx="226423" cy="184888"/>
           </a:xfrm>
           <a:prstGeom prst="triangle">
@@ -3557,7 +3557,7 @@
         </p:nvCxnSpPr>
         <p:spPr>
           <a:xfrm>
-            <a:off x="5552224" y="1266865"/>
+            <a:off x="5552224" y="1118814"/>
             <a:ext cx="1609040" cy="9370"/>
           </a:xfrm>
           <a:prstGeom prst="line">
@@ -3587,7 +3587,7 @@
         </p:nvSpPr>
         <p:spPr>
           <a:xfrm>
-            <a:off x="7218567" y="960518"/>
+            <a:off x="7218567" y="812467"/>
             <a:ext cx="1632857" cy="882723"/>
           </a:xfrm>
           <a:prstGeom prst="roundRect">
@@ -3628,7 +3628,7 @@
         </p:nvSpPr>
         <p:spPr>
           <a:xfrm rot="5400000">
-            <a:off x="8785366" y="1183790"/>
+            <a:off x="8785366" y="1035739"/>
             <a:ext cx="226423" cy="184888"/>
           </a:xfrm>
           <a:prstGeom prst="triangle">
@@ -3671,7 +3671,7 @@
         </p:nvSpPr>
         <p:spPr>
           <a:xfrm rot="5400000">
-            <a:off x="7140496" y="1183790"/>
+            <a:off x="7140496" y="1035739"/>
             <a:ext cx="226423" cy="184888"/>
           </a:xfrm>
           <a:prstGeom prst="triangle">
@@ -3714,7 +3714,7 @@
         </p:nvSpPr>
         <p:spPr>
           <a:xfrm>
-            <a:off x="7369239" y="2176971"/>
+            <a:off x="7369239" y="2028920"/>
             <a:ext cx="1387040" cy="1061829"/>
           </a:xfrm>
           <a:prstGeom prst="rect">
@@ -3741,10 +3741,10 @@
               <a:t>”  exit at </a:t>
             </a:r>
             <a:r>
-              <a:rPr lang="en-US" sz="900" dirty="0" err="1" smtClean="0"/>
+              <a:rPr lang="en-US" sz="900" dirty="0" err="1"/>
               <a:t>AlternativeRoad</a:t>
             </a:r>
-            <a:endParaRPr lang="en-US" sz="900" dirty="0" smtClean="0"/>
+            <a:endParaRPr lang="en-US" sz="900" dirty="0"/>
           </a:p>
           <a:p>
             <a:endParaRPr lang="en-US" sz="900" dirty="0"/>
@@ -3778,7 +3778,7 @@
         </p:nvSpPr>
         <p:spPr>
           <a:xfrm>
-            <a:off x="562179" y="3686434"/>
+            <a:off x="562179" y="3538383"/>
             <a:ext cx="1068920" cy="566057"/>
           </a:xfrm>
           <a:prstGeom prst="roundRect">
@@ -3819,7 +3819,7 @@
         </p:nvSpPr>
         <p:spPr>
           <a:xfrm rot="5400000">
-            <a:off x="1517887" y="3877018"/>
+            <a:off x="1517887" y="3728967"/>
             <a:ext cx="226423" cy="184888"/>
           </a:xfrm>
           <a:prstGeom prst="triangle">
@@ -3862,7 +3862,7 @@
         </p:nvSpPr>
         <p:spPr>
           <a:xfrm>
-            <a:off x="562179" y="3686434"/>
+            <a:off x="562179" y="3538383"/>
             <a:ext cx="338554" cy="215444"/>
           </a:xfrm>
           <a:prstGeom prst="rect">
@@ -3878,7 +3878,7 @@
           <a:p>
             <a:r>
               <a:rPr lang="en-US" sz="800" dirty="0"/>
-              <a:t>EP2</a:t>
+              <a:t>EP3</a:t>
             </a:r>
             <a:endParaRPr lang="en-SG" sz="800" dirty="0"/>
           </a:p>
@@ -3892,7 +3892,7 @@
         </p:nvSpPr>
         <p:spPr>
           <a:xfrm>
-            <a:off x="588326" y="3856250"/>
+            <a:off x="588326" y="3708199"/>
             <a:ext cx="950327" cy="400110"/>
           </a:xfrm>
           <a:prstGeom prst="rect">
@@ -3926,7 +3926,7 @@
         </p:nvSpPr>
         <p:spPr>
           <a:xfrm>
-            <a:off x="7357377" y="1043906"/>
+            <a:off x="7357377" y="895855"/>
             <a:ext cx="1455764" cy="784830"/>
           </a:xfrm>
           <a:prstGeom prst="rect">
@@ -3941,11 +3941,7 @@
           <a:p>
             <a:r>
               <a:rPr lang="en-SG" sz="900" dirty="0"/>
-              <a:t>message  =  </a:t>
-            </a:r>
-            <a:r>
-              <a:rPr lang="en-SG" sz="900" dirty="0" smtClean="0"/>
-              <a:t>“Lesser traffic” at road</a:t>
+              <a:t>message  =  “Lesser traffic” at road</a:t>
             </a:r>
           </a:p>
           <a:p>
@@ -3954,17 +3950,8 @@
           <a:p>
             <a:r>
               <a:rPr lang="en-SG" sz="900" dirty="0"/>
-              <a:t>message  =  </a:t>
-            </a:r>
-            <a:r>
-              <a:rPr lang="en-SG" sz="900" dirty="0" smtClean="0"/>
-              <a:t>“slowdown” </a:t>
-            </a:r>
-            <a:r>
-              <a:rPr lang="en-SG" sz="900" dirty="0"/>
-              <a:t>at road</a:t>
-            </a:r>
-            <a:endParaRPr lang="en-SG" sz="900" dirty="0"/>
+              <a:t>message  =  “slowdown” at road</a:t>
+            </a:r>
           </a:p>
         </p:txBody>
       </p:sp>
@@ -3976,7 +3963,7 @@
         </p:nvSpPr>
         <p:spPr>
           <a:xfrm>
-            <a:off x="1960560" y="2106500"/>
+            <a:off x="1960560" y="1958449"/>
             <a:ext cx="774943" cy="467052"/>
           </a:xfrm>
           <a:prstGeom prst="hexagon">
@@ -4019,46 +4006,11 @@
         </p:nvCxnSpPr>
         <p:spPr>
           <a:xfrm>
-            <a:off x="1729236" y="2338099"/>
+            <a:off x="1729236" y="2190048"/>
             <a:ext cx="290614" cy="1895"/>
           </a:xfrm>
           <a:prstGeom prst="line">
             <a:avLst/>
-          </a:prstGeom>
-        </p:spPr>
-        <p:style>
-          <a:lnRef idx="1">
-            <a:schemeClr val="accent1"/>
-          </a:lnRef>
-          <a:fillRef idx="0">
-            <a:schemeClr val="accent1"/>
-          </a:fillRef>
-          <a:effectRef idx="0">
-            <a:schemeClr val="accent1"/>
-          </a:effectRef>
-          <a:fontRef idx="minor">
-            <a:schemeClr val="tx1"/>
-          </a:fontRef>
-        </p:style>
-      </p:cxnSp>
-      <p:cxnSp>
-        <p:nvCxnSpPr>
-          <p:cNvPr id="59" name="Connector: Elbow 58"/>
-          <p:cNvCxnSpPr>
-            <a:stCxn id="55" idx="0"/>
-            <a:endCxn id="21" idx="3"/>
-          </p:cNvCxnSpPr>
-          <p:nvPr/>
-        </p:nvCxnSpPr>
-        <p:spPr>
-          <a:xfrm flipV="1">
-            <a:off x="2735503" y="1274486"/>
-            <a:ext cx="977970" cy="1065540"/>
-          </a:xfrm>
-          <a:prstGeom prst="bentConnector3">
-            <a:avLst>
-              <a:gd name="adj1" fmla="val 50000"/>
-            </a:avLst>
           </a:prstGeom>
         </p:spPr>
         <p:style>
@@ -4084,7 +4036,7 @@
         </p:nvSpPr>
         <p:spPr>
           <a:xfrm>
-            <a:off x="2064052" y="2229692"/>
+            <a:off x="2064052" y="2081641"/>
             <a:ext cx="579005" cy="215444"/>
           </a:xfrm>
           <a:prstGeom prst="rect">
@@ -4117,8 +4069,8 @@
         </p:nvCxnSpPr>
         <p:spPr>
           <a:xfrm>
-            <a:off x="8991022" y="1276235"/>
-            <a:ext cx="1347040" cy="1418446"/>
+            <a:off x="8991022" y="1128184"/>
+            <a:ext cx="1347040" cy="1566497"/>
           </a:xfrm>
           <a:prstGeom prst="bentConnector3">
             <a:avLst/>
@@ -4147,7 +4099,7 @@
         </p:nvSpPr>
         <p:spPr>
           <a:xfrm>
-            <a:off x="7239933" y="2083079"/>
+            <a:off x="7239933" y="1935028"/>
             <a:ext cx="1632857" cy="1192934"/>
           </a:xfrm>
           <a:prstGeom prst="roundRect">
@@ -4188,7 +4140,7 @@
         </p:nvSpPr>
         <p:spPr>
           <a:xfrm rot="5400000">
-            <a:off x="8806732" y="2338413"/>
+            <a:off x="8806732" y="2190362"/>
             <a:ext cx="226423" cy="184888"/>
           </a:xfrm>
           <a:prstGeom prst="triangle">
@@ -4231,7 +4183,7 @@
         </p:nvSpPr>
         <p:spPr>
           <a:xfrm rot="5400000">
-            <a:off x="7161862" y="2364540"/>
+            <a:off x="7161862" y="2216489"/>
             <a:ext cx="226423" cy="184888"/>
           </a:xfrm>
           <a:prstGeom prst="triangle">
@@ -4277,8 +4229,8 @@
         </p:nvCxnSpPr>
         <p:spPr>
           <a:xfrm>
-            <a:off x="9012388" y="2430858"/>
-            <a:ext cx="1325674" cy="263823"/>
+            <a:off x="9012388" y="2282807"/>
+            <a:ext cx="1325674" cy="411874"/>
           </a:xfrm>
           <a:prstGeom prst="bentConnector3">
             <a:avLst>
@@ -4309,7 +4261,7 @@
         </p:nvSpPr>
         <p:spPr>
           <a:xfrm>
-            <a:off x="3783980" y="1999052"/>
+            <a:off x="3740435" y="1851001"/>
             <a:ext cx="1632857" cy="1246036"/>
           </a:xfrm>
           <a:prstGeom prst="roundRect">
@@ -4350,7 +4302,7 @@
         </p:nvSpPr>
         <p:spPr>
           <a:xfrm>
-            <a:off x="3840046" y="2021674"/>
+            <a:off x="3796501" y="1873623"/>
             <a:ext cx="1236236" cy="215444"/>
           </a:xfrm>
           <a:prstGeom prst="rect">
@@ -4365,16 +4317,8 @@
           <a:lstStyle/>
           <a:p>
             <a:r>
-              <a:rPr lang="en-US" sz="800" dirty="0" smtClean="0"/>
-              <a:t>EPA2: Pattern </a:t>
-            </a:r>
-            <a:r>
               <a:rPr lang="en-US" sz="800" dirty="0"/>
-              <a:t>- </a:t>
-            </a:r>
-            <a:r>
-              <a:rPr lang="en-US" sz="800" dirty="0" smtClean="0"/>
-              <a:t>Temporal</a:t>
+              <a:t>EPA2: Pattern - Temporal</a:t>
             </a:r>
             <a:endParaRPr lang="en-SG" sz="800" dirty="0"/>
           </a:p>
@@ -4388,7 +4332,7 @@
         </p:nvSpPr>
         <p:spPr>
           <a:xfrm rot="5400000">
-            <a:off x="3702547" y="2371653"/>
+            <a:off x="3659002" y="2223602"/>
             <a:ext cx="226423" cy="184888"/>
           </a:xfrm>
           <a:prstGeom prst="triangle">
@@ -4431,7 +4375,7 @@
         </p:nvSpPr>
         <p:spPr>
           <a:xfrm rot="5400000">
-            <a:off x="5348241" y="2365571"/>
+            <a:off x="5304696" y="2217520"/>
             <a:ext cx="226423" cy="184888"/>
           </a:xfrm>
           <a:prstGeom prst="triangle">
@@ -4468,56 +4412,13 @@
       </p:sp>
       <p:sp>
         <p:nvSpPr>
-          <p:cNvPr id="96" name="Isosceles Triangle 95"/>
-          <p:cNvSpPr/>
-          <p:nvPr/>
-        </p:nvSpPr>
-        <p:spPr>
-          <a:xfrm rot="5400000">
-            <a:off x="5354821" y="2779547"/>
-            <a:ext cx="226423" cy="184888"/>
-          </a:xfrm>
-          <a:prstGeom prst="triangle">
-            <a:avLst/>
-          </a:prstGeom>
-          <a:solidFill>
-            <a:srgbClr val="FFFF00"/>
-          </a:solidFill>
-        </p:spPr>
-        <p:style>
-          <a:lnRef idx="2">
-            <a:schemeClr val="accent1">
-              <a:shade val="50000"/>
-            </a:schemeClr>
-          </a:lnRef>
-          <a:fillRef idx="1">
-            <a:schemeClr val="accent1"/>
-          </a:fillRef>
-          <a:effectRef idx="0">
-            <a:schemeClr val="accent1"/>
-          </a:effectRef>
-          <a:fontRef idx="minor">
-            <a:schemeClr val="lt1"/>
-          </a:fontRef>
-        </p:style>
-        <p:txBody>
-          <a:bodyPr rtlCol="0" anchor="ctr"/>
-          <a:lstStyle/>
-          <a:p>
-            <a:pPr algn="ctr"/>
-            <a:endParaRPr lang="en-SG"/>
-          </a:p>
-        </p:txBody>
-      </p:sp>
-      <p:sp>
-        <p:nvSpPr>
           <p:cNvPr id="97" name="TextBox 96"/>
           <p:cNvSpPr txBox="1"/>
           <p:nvPr/>
         </p:nvSpPr>
         <p:spPr>
           <a:xfrm>
-            <a:off x="5452083" y="2242188"/>
+            <a:off x="5408538" y="2094137"/>
             <a:ext cx="482824" cy="215444"/>
           </a:xfrm>
           <a:prstGeom prst="rect">
@@ -4534,36 +4435,6 @@
             <a:r>
               <a:rPr lang="en-US" sz="800" dirty="0"/>
               <a:t>Output</a:t>
-            </a:r>
-            <a:endParaRPr lang="en-SG" sz="800" dirty="0"/>
-          </a:p>
-        </p:txBody>
-      </p:sp>
-      <p:sp>
-        <p:nvSpPr>
-          <p:cNvPr id="98" name="TextBox 97"/>
-          <p:cNvSpPr txBox="1"/>
-          <p:nvPr/>
-        </p:nvSpPr>
-        <p:spPr>
-          <a:xfrm>
-            <a:off x="5446780" y="2902861"/>
-            <a:ext cx="716863" cy="215444"/>
-          </a:xfrm>
-          <a:prstGeom prst="rect">
-            <a:avLst/>
-          </a:prstGeom>
-          <a:noFill/>
-        </p:spPr>
-        <p:txBody>
-          <a:bodyPr wrap="none" rtlCol="0">
-            <a:spAutoFit/>
-          </a:bodyPr>
-          <a:lstStyle/>
-          <a:p>
-            <a:r>
-              <a:rPr lang="en-US" sz="800" dirty="0"/>
-              <a:t>Not Selected</a:t>
             </a:r>
             <a:endParaRPr lang="en-SG" sz="800" dirty="0"/>
           </a:p>
@@ -4580,8 +4451,8 @@
         </p:nvCxnSpPr>
         <p:spPr>
           <a:xfrm>
-            <a:off x="2735503" y="2340026"/>
-            <a:ext cx="987812" cy="124072"/>
+            <a:off x="2735503" y="2191975"/>
+            <a:ext cx="944267" cy="124072"/>
           </a:xfrm>
           <a:prstGeom prst="bentConnector3">
             <a:avLst>
@@ -4612,7 +4483,7 @@
         </p:nvSpPr>
         <p:spPr>
           <a:xfrm>
-            <a:off x="3939107" y="1136546"/>
+            <a:off x="3939107" y="988495"/>
             <a:ext cx="1722405" cy="646331"/>
           </a:xfrm>
           <a:prstGeom prst="rect">
@@ -4626,7 +4497,7 @@
           <a:lstStyle/>
           <a:p>
             <a:r>
-              <a:rPr lang="en-US" sz="900" dirty="0" smtClean="0"/>
+              <a:rPr lang="en-US" sz="900" dirty="0"/>
               <a:t>Estimated travel increase</a:t>
             </a:r>
             <a:endParaRPr lang="en-SG" sz="900" dirty="0"/>
@@ -4639,7 +4510,7 @@
           </a:p>
           <a:p>
             <a:r>
-              <a:rPr lang="en-US" sz="900" dirty="0" smtClean="0"/>
+              <a:rPr lang="en-US" sz="900" dirty="0"/>
               <a:t>Estimated travel decrease</a:t>
             </a:r>
             <a:endParaRPr lang="en-SG" sz="900" dirty="0"/>
@@ -4657,8 +4528,8 @@
         </p:nvCxnSpPr>
         <p:spPr>
           <a:xfrm flipV="1">
-            <a:off x="5553897" y="2456985"/>
-            <a:ext cx="1628733" cy="1031"/>
+            <a:off x="5510352" y="2308934"/>
+            <a:ext cx="1672278" cy="1031"/>
           </a:xfrm>
           <a:prstGeom prst="line">
             <a:avLst/>
@@ -4683,14 +4554,15 @@
         <p:nvCxnSpPr>
           <p:cNvPr id="120" name="Connector: Elbow 119"/>
           <p:cNvCxnSpPr>
+            <a:stCxn id="144" idx="0"/>
             <a:endCxn id="12" idx="3"/>
           </p:cNvCxnSpPr>
           <p:nvPr/>
         </p:nvCxnSpPr>
         <p:spPr>
           <a:xfrm flipV="1">
-            <a:off x="8991826" y="2694681"/>
-            <a:ext cx="1346236" cy="999776"/>
+            <a:off x="9016708" y="2694681"/>
+            <a:ext cx="1321354" cy="855961"/>
           </a:xfrm>
           <a:prstGeom prst="bentConnector3">
             <a:avLst/>
@@ -4752,7 +4624,7 @@
         </p:nvSpPr>
         <p:spPr>
           <a:xfrm>
-            <a:off x="3945570" y="2137312"/>
+            <a:off x="3945570" y="1989261"/>
             <a:ext cx="1722405" cy="1200329"/>
           </a:xfrm>
           <a:prstGeom prst="rect">
@@ -4779,11 +4651,7 @@
           <a:p>
             <a:r>
               <a:rPr lang="en-SG" sz="900" dirty="0"/>
-              <a:t>current speed band = </a:t>
-            </a:r>
-            <a:r>
-              <a:rPr lang="en-SG" sz="900" dirty="0" smtClean="0"/>
-              <a:t>1</a:t>
+              <a:t>current speed band = 1</a:t>
             </a:r>
           </a:p>
           <a:p>
@@ -4820,7 +4688,7 @@
         </p:nvSpPr>
         <p:spPr>
           <a:xfrm rot="5400000">
-            <a:off x="5348512" y="1181584"/>
+            <a:off x="5348512" y="1033533"/>
             <a:ext cx="226423" cy="184888"/>
           </a:xfrm>
           <a:prstGeom prst="triangle">
@@ -4863,7 +4731,7 @@
         </p:nvSpPr>
         <p:spPr>
           <a:xfrm rot="5400000">
-            <a:off x="5355092" y="1595560"/>
+            <a:off x="5310029" y="2675102"/>
             <a:ext cx="226423" cy="184888"/>
           </a:xfrm>
           <a:prstGeom prst="triangle">
@@ -4906,7 +4774,7 @@
         </p:nvSpPr>
         <p:spPr>
           <a:xfrm>
-            <a:off x="5452354" y="1058201"/>
+            <a:off x="5452354" y="910150"/>
             <a:ext cx="482824" cy="215444"/>
           </a:xfrm>
           <a:prstGeom prst="rect">
@@ -4936,7 +4804,7 @@
         </p:nvSpPr>
         <p:spPr>
           <a:xfrm>
-            <a:off x="5447051" y="1718874"/>
+            <a:off x="5401988" y="2798416"/>
             <a:ext cx="716863" cy="215444"/>
           </a:xfrm>
           <a:prstGeom prst="rect">
@@ -4952,11 +4820,7 @@
           <a:p>
             <a:r>
               <a:rPr lang="en-US" sz="800" dirty="0"/>
-              <a:t>Not </a:t>
-            </a:r>
-            <a:r>
-              <a:rPr lang="en-US" sz="800" dirty="0" smtClean="0"/>
-              <a:t>Selected</a:t>
+              <a:t>Not Selected</a:t>
             </a:r>
             <a:endParaRPr lang="en-SG" sz="800" dirty="0"/>
           </a:p>
@@ -4973,7 +4837,7 @@
         </p:nvCxnSpPr>
         <p:spPr>
           <a:xfrm>
-            <a:off x="1723543" y="3969463"/>
+            <a:off x="1723543" y="3821412"/>
             <a:ext cx="1986507" cy="6293"/>
           </a:xfrm>
           <a:prstGeom prst="line">
@@ -5003,7 +4867,7 @@
         </p:nvSpPr>
         <p:spPr>
           <a:xfrm>
-            <a:off x="3768589" y="3348659"/>
+            <a:off x="3768589" y="3200608"/>
             <a:ext cx="1632857" cy="885894"/>
           </a:xfrm>
           <a:prstGeom prst="roundRect">
@@ -5044,7 +4908,7 @@
         </p:nvSpPr>
         <p:spPr>
           <a:xfrm>
-            <a:off x="3816752" y="3394938"/>
+            <a:off x="3816752" y="3246887"/>
             <a:ext cx="1117614" cy="215444"/>
           </a:xfrm>
           <a:prstGeom prst="rect">
@@ -5074,7 +4938,7 @@
         </p:nvSpPr>
         <p:spPr>
           <a:xfrm rot="5400000">
-            <a:off x="3689282" y="3883311"/>
+            <a:off x="3689282" y="3735260"/>
             <a:ext cx="226423" cy="184888"/>
           </a:xfrm>
           <a:prstGeom prst="triangle">
@@ -5117,7 +4981,7 @@
         </p:nvSpPr>
         <p:spPr>
           <a:xfrm rot="5400000">
-            <a:off x="5332850" y="3502144"/>
+            <a:off x="5332850" y="3354093"/>
             <a:ext cx="226423" cy="184888"/>
           </a:xfrm>
           <a:prstGeom prst="triangle">
@@ -5160,7 +5024,7 @@
         </p:nvSpPr>
         <p:spPr>
           <a:xfrm rot="5400000">
-            <a:off x="5339430" y="3916120"/>
+            <a:off x="5339430" y="3768069"/>
             <a:ext cx="226423" cy="184888"/>
           </a:xfrm>
           <a:prstGeom prst="triangle">
@@ -5203,7 +5067,7 @@
         </p:nvSpPr>
         <p:spPr>
           <a:xfrm>
-            <a:off x="5436692" y="3378761"/>
+            <a:off x="5436692" y="3230710"/>
             <a:ext cx="482824" cy="215444"/>
           </a:xfrm>
           <a:prstGeom prst="rect">
@@ -5233,7 +5097,7 @@
         </p:nvSpPr>
         <p:spPr>
           <a:xfrm>
-            <a:off x="5431389" y="4039434"/>
+            <a:off x="5431389" y="3891383"/>
             <a:ext cx="716863" cy="215444"/>
           </a:xfrm>
           <a:prstGeom prst="rect">
@@ -5263,7 +5127,7 @@
         </p:nvSpPr>
         <p:spPr>
           <a:xfrm>
-            <a:off x="3887032" y="3578818"/>
+            <a:off x="3887032" y="3430767"/>
             <a:ext cx="1722405" cy="507831"/>
           </a:xfrm>
           <a:prstGeom prst="rect">
@@ -5303,7 +5167,7 @@
         </p:nvSpPr>
         <p:spPr>
           <a:xfrm rot="5400000">
-            <a:off x="3671979" y="3481880"/>
+            <a:off x="3671979" y="3333829"/>
             <a:ext cx="226423" cy="184888"/>
           </a:xfrm>
           <a:prstGeom prst="triangle">
@@ -5349,7 +5213,7 @@
         </p:nvCxnSpPr>
         <p:spPr>
           <a:xfrm>
-            <a:off x="2735503" y="2340026"/>
+            <a:off x="2735503" y="2191975"/>
             <a:ext cx="957244" cy="1234299"/>
           </a:xfrm>
           <a:prstGeom prst="bentConnector3">
@@ -5381,7 +5245,7 @@
         </p:nvSpPr>
         <p:spPr>
           <a:xfrm>
-            <a:off x="7364142" y="3629931"/>
+            <a:off x="7364142" y="3481880"/>
             <a:ext cx="1326513" cy="507831"/>
           </a:xfrm>
           <a:prstGeom prst="rect">
@@ -5409,7 +5273,7 @@
         </p:nvSpPr>
         <p:spPr>
           <a:xfrm>
-            <a:off x="7253707" y="3405398"/>
+            <a:off x="7253707" y="3257347"/>
             <a:ext cx="1632857" cy="885894"/>
           </a:xfrm>
           <a:prstGeom prst="roundRect">
@@ -5450,7 +5314,7 @@
         </p:nvSpPr>
         <p:spPr>
           <a:xfrm rot="5400000">
-            <a:off x="8811052" y="3606248"/>
+            <a:off x="8811052" y="3458197"/>
             <a:ext cx="226423" cy="184888"/>
           </a:xfrm>
           <a:prstGeom prst="triangle">
@@ -5493,7 +5357,7 @@
         </p:nvSpPr>
         <p:spPr>
           <a:xfrm rot="5400000">
-            <a:off x="7175636" y="3508897"/>
+            <a:off x="7175636" y="3360846"/>
             <a:ext cx="226423" cy="184888"/>
           </a:xfrm>
           <a:prstGeom prst="triangle">
@@ -5539,7 +5403,7 @@
         </p:nvCxnSpPr>
         <p:spPr>
           <a:xfrm>
-            <a:off x="5538506" y="3594589"/>
+            <a:off x="5538506" y="3446538"/>
             <a:ext cx="1657898" cy="6753"/>
           </a:xfrm>
           <a:prstGeom prst="line">
@@ -5669,7 +5533,7 @@
           <a:p>
             <a:r>
               <a:rPr lang="en-US" sz="800" dirty="0"/>
-              <a:t>EP3</a:t>
+              <a:t>EP5</a:t>
             </a:r>
             <a:endParaRPr lang="en-SG" sz="800" dirty="0"/>
           </a:p>
@@ -6137,19 +6001,15 @@
           <a:p>
             <a:r>
               <a:rPr lang="en-SG" sz="900" dirty="0"/>
-              <a:t>message  =  </a:t>
-            </a:r>
-            <a:r>
-              <a:rPr lang="en-SG" sz="900" dirty="0" smtClean="0"/>
-              <a:t>Traffic accident at.</a:t>
-            </a:r>
-          </a:p>
-          <a:p>
-            <a:endParaRPr lang="en-US" sz="900" dirty="0" smtClean="0"/>
-          </a:p>
-          <a:p>
-            <a:r>
-              <a:rPr lang="en-US" sz="900" dirty="0" smtClean="0"/>
+              <a:t>message  =  Traffic accident at.</a:t>
+            </a:r>
+          </a:p>
+          <a:p>
+            <a:endParaRPr lang="en-US" sz="900" dirty="0"/>
+          </a:p>
+          <a:p>
+            <a:r>
+              <a:rPr lang="en-US" sz="900" dirty="0"/>
               <a:t>message = roadworks at</a:t>
             </a:r>
             <a:endParaRPr lang="en-SG" sz="900" dirty="0"/>
@@ -6408,7 +6268,7 @@
         </p:nvSpPr>
         <p:spPr>
           <a:xfrm>
-            <a:off x="6206188" y="4196890"/>
+            <a:off x="6206187" y="3682265"/>
             <a:ext cx="615863" cy="804643"/>
           </a:xfrm>
           <a:prstGeom prst="can">
@@ -6449,7 +6309,7 @@
         </p:nvSpPr>
         <p:spPr>
           <a:xfrm>
-            <a:off x="6191750" y="4379328"/>
+            <a:off x="6191749" y="3864703"/>
             <a:ext cx="630301" cy="461665"/>
           </a:xfrm>
           <a:prstGeom prst="rect">
@@ -6487,14 +6347,13 @@
         <p:nvCxnSpPr>
           <p:cNvPr id="16" name="Connector: Elbow 15"/>
           <p:cNvCxnSpPr>
-            <a:stCxn id="110" idx="0"/>
             <a:endCxn id="73" idx="1"/>
           </p:cNvCxnSpPr>
           <p:nvPr/>
         </p:nvCxnSpPr>
         <p:spPr>
           <a:xfrm rot="5400000" flipH="1" flipV="1">
-            <a:off x="6041371" y="3152295"/>
+            <a:off x="6041371" y="3004244"/>
             <a:ext cx="1671310" cy="725813"/>
           </a:xfrm>
           <a:prstGeom prst="bentConnector2">
@@ -6524,14 +6383,13 @@
         <p:nvCxnSpPr>
           <p:cNvPr id="22" name="Connector: Elbow 21"/>
           <p:cNvCxnSpPr>
-            <a:stCxn id="110" idx="0"/>
             <a:endCxn id="27" idx="1"/>
           </p:cNvCxnSpPr>
           <p:nvPr/>
         </p:nvCxnSpPr>
         <p:spPr>
           <a:xfrm rot="5400000" flipH="1" flipV="1">
-            <a:off x="5391855" y="2524145"/>
+            <a:off x="5391855" y="2376094"/>
             <a:ext cx="2948976" cy="704447"/>
           </a:xfrm>
           <a:prstGeom prst="bentConnector2">
@@ -6565,7 +6423,7 @@
         </p:nvSpPr>
         <p:spPr>
           <a:xfrm>
-            <a:off x="589965" y="1085849"/>
+            <a:off x="589965" y="937798"/>
             <a:ext cx="1068920" cy="566057"/>
           </a:xfrm>
           <a:prstGeom prst="roundRect">
@@ -6606,7 +6464,7 @@
         </p:nvSpPr>
         <p:spPr>
           <a:xfrm rot="5400000">
-            <a:off x="1610772" y="1164654"/>
+            <a:off x="1610772" y="1016603"/>
             <a:ext cx="226423" cy="184888"/>
           </a:xfrm>
           <a:prstGeom prst="triangle">
@@ -6646,14 +6504,13 @@
           <p:cNvPr id="119" name="Straight Connector 118"/>
           <p:cNvCxnSpPr>
             <a:stCxn id="117" idx="0"/>
-            <a:endCxn id="121" idx="3"/>
           </p:cNvCxnSpPr>
           <p:nvPr/>
         </p:nvCxnSpPr>
         <p:spPr>
           <a:xfrm>
-            <a:off x="1816428" y="1257099"/>
-            <a:ext cx="1882795" cy="34388"/>
+            <a:off x="1816428" y="1109048"/>
+            <a:ext cx="1882795" cy="34389"/>
           </a:xfrm>
           <a:prstGeom prst="line">
             <a:avLst/>
@@ -6676,21 +6533,79 @@
       </p:cxnSp>
       <p:sp>
         <p:nvSpPr>
-          <p:cNvPr id="121" name="Isosceles Triangle 120"/>
+          <p:cNvPr id="122" name="TextBox 121"/>
+          <p:cNvSpPr txBox="1"/>
+          <p:nvPr/>
+        </p:nvSpPr>
+        <p:spPr>
+          <a:xfrm>
+            <a:off x="601335" y="939232"/>
+            <a:ext cx="338554" cy="215444"/>
+          </a:xfrm>
+          <a:prstGeom prst="rect">
+            <a:avLst/>
+          </a:prstGeom>
+          <a:noFill/>
+        </p:spPr>
+        <p:txBody>
+          <a:bodyPr wrap="none" rtlCol="0">
+            <a:spAutoFit/>
+          </a:bodyPr>
+          <a:lstStyle/>
+          <a:p>
+            <a:r>
+              <a:rPr lang="en-US" sz="800" dirty="0"/>
+              <a:t>EP1</a:t>
+            </a:r>
+            <a:endParaRPr lang="en-SG" sz="800" dirty="0"/>
+          </a:p>
+        </p:txBody>
+      </p:sp>
+      <p:sp>
+        <p:nvSpPr>
+          <p:cNvPr id="123" name="TextBox 122"/>
+          <p:cNvSpPr txBox="1"/>
+          <p:nvPr/>
+        </p:nvSpPr>
+        <p:spPr>
+          <a:xfrm>
+            <a:off x="627482" y="1109048"/>
+            <a:ext cx="950327" cy="400110"/>
+          </a:xfrm>
+          <a:prstGeom prst="rect">
+            <a:avLst/>
+          </a:prstGeom>
+          <a:noFill/>
+        </p:spPr>
+        <p:txBody>
+          <a:bodyPr wrap="square" rtlCol="0">
+            <a:spAutoFit/>
+          </a:bodyPr>
+          <a:lstStyle/>
+          <a:p>
+            <a:r>
+              <a:rPr lang="en-US" sz="1000" dirty="0"/>
+              <a:t>Estimated Travel Time</a:t>
+            </a:r>
+            <a:endParaRPr lang="en-SG" sz="1000" dirty="0"/>
+          </a:p>
+        </p:txBody>
+      </p:sp>
+      <p:sp>
+        <p:nvSpPr>
+          <p:cNvPr id="101" name="Rectangle: Rounded Corners 100"/>
           <p:cNvSpPr/>
           <p:nvPr/>
         </p:nvSpPr>
         <p:spPr>
-          <a:xfrm rot="5400000">
-            <a:off x="3678455" y="1199042"/>
-            <a:ext cx="226423" cy="184888"/>
-          </a:xfrm>
-          <a:prstGeom prst="triangle">
-            <a:avLst/>
-          </a:prstGeom>
-          <a:solidFill>
-            <a:srgbClr val="FFFF00"/>
-          </a:solidFill>
+          <a:xfrm>
+            <a:off x="575188" y="4264486"/>
+            <a:ext cx="1068920" cy="566057"/>
+          </a:xfrm>
+          <a:prstGeom prst="roundRect">
+            <a:avLst/>
+          </a:prstGeom>
+          <a:noFill/>
         </p:spPr>
         <p:style>
           <a:lnRef idx="2">
@@ -6719,13 +6634,56 @@
       </p:sp>
       <p:sp>
         <p:nvSpPr>
-          <p:cNvPr id="122" name="TextBox 121"/>
+          <p:cNvPr id="102" name="Isosceles Triangle 101"/>
+          <p:cNvSpPr/>
+          <p:nvPr/>
+        </p:nvSpPr>
+        <p:spPr>
+          <a:xfrm rot="5400000">
+            <a:off x="1530896" y="4455071"/>
+            <a:ext cx="226423" cy="184888"/>
+          </a:xfrm>
+          <a:prstGeom prst="triangle">
+            <a:avLst/>
+          </a:prstGeom>
+          <a:solidFill>
+            <a:srgbClr val="FFFF00"/>
+          </a:solidFill>
+        </p:spPr>
+        <p:style>
+          <a:lnRef idx="2">
+            <a:schemeClr val="accent1">
+              <a:shade val="50000"/>
+            </a:schemeClr>
+          </a:lnRef>
+          <a:fillRef idx="1">
+            <a:schemeClr val="accent1"/>
+          </a:fillRef>
+          <a:effectRef idx="0">
+            <a:schemeClr val="accent1"/>
+          </a:effectRef>
+          <a:fontRef idx="minor">
+            <a:schemeClr val="lt1"/>
+          </a:fontRef>
+        </p:style>
+        <p:txBody>
+          <a:bodyPr rtlCol="0" anchor="ctr"/>
+          <a:lstStyle/>
+          <a:p>
+            <a:pPr algn="ctr"/>
+            <a:endParaRPr lang="en-SG"/>
+          </a:p>
+        </p:txBody>
+      </p:sp>
+      <p:sp>
+        <p:nvSpPr>
+          <p:cNvPr id="103" name="TextBox 102"/>
           <p:cNvSpPr txBox="1"/>
           <p:nvPr/>
         </p:nvSpPr>
         <p:spPr>
           <a:xfrm>
-            <a:off x="601335" y="1087283"/>
+            <a:off x="575188" y="4264486"/>
             <a:ext cx="338554" cy="215444"/>
           </a:xfrm>
           <a:prstGeom prst="rect">
@@ -6741,7 +6699,7 @@
           <a:p>
             <a:r>
               <a:rPr lang="en-US" sz="800" dirty="0"/>
-              <a:t>EP1</a:t>
+              <a:t>EP4</a:t>
             </a:r>
             <a:endParaRPr lang="en-SG" sz="800" dirty="0"/>
           </a:p>
@@ -6749,13 +6707,13 @@
       </p:sp>
       <p:sp>
         <p:nvSpPr>
-          <p:cNvPr id="123" name="TextBox 122"/>
+          <p:cNvPr id="112" name="TextBox 111"/>
           <p:cNvSpPr txBox="1"/>
           <p:nvPr/>
         </p:nvSpPr>
         <p:spPr>
           <a:xfrm>
-            <a:off x="627482" y="1257099"/>
+            <a:off x="601335" y="4434302"/>
             <a:ext cx="950327" cy="400110"/>
           </a:xfrm>
           <a:prstGeom prst="rect">
@@ -6770,13 +6728,237 @@
           <a:lstStyle/>
           <a:p>
             <a:r>
-              <a:rPr lang="en-US" sz="1000" dirty="0" smtClean="0"/>
-              <a:t>Estimated Travel Time</a:t>
+              <a:rPr lang="en-US" sz="1000" dirty="0"/>
+              <a:t>NEA Heavy Rain Warning</a:t>
             </a:r>
             <a:endParaRPr lang="en-SG" sz="1000" dirty="0"/>
           </a:p>
         </p:txBody>
       </p:sp>
+      <p:sp>
+        <p:nvSpPr>
+          <p:cNvPr id="113" name="Rectangle 112"/>
+          <p:cNvSpPr/>
+          <p:nvPr/>
+        </p:nvSpPr>
+        <p:spPr>
+          <a:xfrm>
+            <a:off x="7396797" y="4603131"/>
+            <a:ext cx="1326513" cy="369332"/>
+          </a:xfrm>
+          <a:prstGeom prst="rect">
+            <a:avLst/>
+          </a:prstGeom>
+        </p:spPr>
+        <p:txBody>
+          <a:bodyPr wrap="square">
+            <a:spAutoFit/>
+          </a:bodyPr>
+          <a:lstStyle/>
+          <a:p>
+            <a:r>
+              <a:rPr lang="en-SG" sz="900" dirty="0"/>
+              <a:t>message  =  “Heavy Rain expected”</a:t>
+            </a:r>
+          </a:p>
+        </p:txBody>
+      </p:sp>
+      <p:sp>
+        <p:nvSpPr>
+          <p:cNvPr id="114" name="Rectangle: Rounded Corners 113"/>
+          <p:cNvSpPr/>
+          <p:nvPr/>
+        </p:nvSpPr>
+        <p:spPr>
+          <a:xfrm>
+            <a:off x="7286362" y="4378598"/>
+            <a:ext cx="1632857" cy="784293"/>
+          </a:xfrm>
+          <a:prstGeom prst="roundRect">
+            <a:avLst/>
+          </a:prstGeom>
+          <a:noFill/>
+        </p:spPr>
+        <p:style>
+          <a:lnRef idx="2">
+            <a:schemeClr val="accent1">
+              <a:shade val="50000"/>
+            </a:schemeClr>
+          </a:lnRef>
+          <a:fillRef idx="1">
+            <a:schemeClr val="accent1"/>
+          </a:fillRef>
+          <a:effectRef idx="0">
+            <a:schemeClr val="accent1"/>
+          </a:effectRef>
+          <a:fontRef idx="minor">
+            <a:schemeClr val="lt1"/>
+          </a:fontRef>
+        </p:style>
+        <p:txBody>
+          <a:bodyPr rtlCol="0" anchor="ctr"/>
+          <a:lstStyle/>
+          <a:p>
+            <a:pPr algn="ctr"/>
+            <a:endParaRPr lang="en-SG"/>
+          </a:p>
+        </p:txBody>
+      </p:sp>
+      <p:sp>
+        <p:nvSpPr>
+          <p:cNvPr id="124" name="Isosceles Triangle 123"/>
+          <p:cNvSpPr/>
+          <p:nvPr/>
+        </p:nvSpPr>
+        <p:spPr>
+          <a:xfrm rot="5400000">
+            <a:off x="8843707" y="4579448"/>
+            <a:ext cx="226423" cy="184888"/>
+          </a:xfrm>
+          <a:prstGeom prst="triangle">
+            <a:avLst/>
+          </a:prstGeom>
+          <a:solidFill>
+            <a:srgbClr val="FFFF00"/>
+          </a:solidFill>
+        </p:spPr>
+        <p:style>
+          <a:lnRef idx="2">
+            <a:schemeClr val="accent1">
+              <a:shade val="50000"/>
+            </a:schemeClr>
+          </a:lnRef>
+          <a:fillRef idx="1">
+            <a:schemeClr val="accent1"/>
+          </a:fillRef>
+          <a:effectRef idx="0">
+            <a:schemeClr val="accent1"/>
+          </a:effectRef>
+          <a:fontRef idx="minor">
+            <a:schemeClr val="lt1"/>
+          </a:fontRef>
+        </p:style>
+        <p:txBody>
+          <a:bodyPr rtlCol="0" anchor="ctr"/>
+          <a:lstStyle/>
+          <a:p>
+            <a:pPr algn="ctr"/>
+            <a:endParaRPr lang="en-SG"/>
+          </a:p>
+        </p:txBody>
+      </p:sp>
+      <p:sp>
+        <p:nvSpPr>
+          <p:cNvPr id="125" name="Isosceles Triangle 124"/>
+          <p:cNvSpPr/>
+          <p:nvPr/>
+        </p:nvSpPr>
+        <p:spPr>
+          <a:xfrm rot="5400000">
+            <a:off x="7208291" y="4482097"/>
+            <a:ext cx="226423" cy="184888"/>
+          </a:xfrm>
+          <a:prstGeom prst="triangle">
+            <a:avLst/>
+          </a:prstGeom>
+          <a:solidFill>
+            <a:srgbClr val="FFFF00"/>
+          </a:solidFill>
+        </p:spPr>
+        <p:style>
+          <a:lnRef idx="2">
+            <a:schemeClr val="accent1">
+              <a:shade val="50000"/>
+            </a:schemeClr>
+          </a:lnRef>
+          <a:fillRef idx="1">
+            <a:schemeClr val="accent1"/>
+          </a:fillRef>
+          <a:effectRef idx="0">
+            <a:schemeClr val="accent1"/>
+          </a:effectRef>
+          <a:fontRef idx="minor">
+            <a:schemeClr val="lt1"/>
+          </a:fontRef>
+        </p:style>
+        <p:txBody>
+          <a:bodyPr rtlCol="0" anchor="ctr"/>
+          <a:lstStyle/>
+          <a:p>
+            <a:pPr algn="ctr"/>
+            <a:endParaRPr lang="en-SG"/>
+          </a:p>
+        </p:txBody>
+      </p:sp>
+      <p:cxnSp>
+        <p:nvCxnSpPr>
+          <p:cNvPr id="18" name="Straight Connector 17"/>
+          <p:cNvCxnSpPr>
+            <a:stCxn id="102" idx="0"/>
+            <a:endCxn id="125" idx="3"/>
+          </p:cNvCxnSpPr>
+          <p:nvPr/>
+        </p:nvCxnSpPr>
+        <p:spPr>
+          <a:xfrm>
+            <a:off x="1736552" y="4547516"/>
+            <a:ext cx="5492507" cy="27026"/>
+          </a:xfrm>
+          <a:prstGeom prst="line">
+            <a:avLst/>
+          </a:prstGeom>
+        </p:spPr>
+        <p:style>
+          <a:lnRef idx="1">
+            <a:schemeClr val="accent1"/>
+          </a:lnRef>
+          <a:fillRef idx="0">
+            <a:schemeClr val="accent1"/>
+          </a:fillRef>
+          <a:effectRef idx="0">
+            <a:schemeClr val="accent1"/>
+          </a:effectRef>
+          <a:fontRef idx="minor">
+            <a:schemeClr val="tx1"/>
+          </a:fontRef>
+        </p:style>
+      </p:cxnSp>
+      <p:cxnSp>
+        <p:nvCxnSpPr>
+          <p:cNvPr id="20" name="Connector: Elbow 19"/>
+          <p:cNvCxnSpPr>
+            <a:stCxn id="124" idx="0"/>
+            <a:endCxn id="12" idx="3"/>
+          </p:cNvCxnSpPr>
+          <p:nvPr/>
+        </p:nvCxnSpPr>
+        <p:spPr>
+          <a:xfrm flipV="1">
+            <a:off x="9049363" y="2694681"/>
+            <a:ext cx="1288699" cy="1977212"/>
+          </a:xfrm>
+          <a:prstGeom prst="bentConnector3">
+            <a:avLst/>
+          </a:prstGeom>
+          <a:ln>
+            <a:tailEnd type="triangle"/>
+          </a:ln>
+        </p:spPr>
+        <p:style>
+          <a:lnRef idx="1">
+            <a:schemeClr val="accent1"/>
+          </a:lnRef>
+          <a:fillRef idx="0">
+            <a:schemeClr val="accent1"/>
+          </a:fillRef>
+          <a:effectRef idx="0">
+            <a:schemeClr val="accent1"/>
+          </a:effectRef>
+          <a:fontRef idx="minor">
+            <a:schemeClr val="tx1"/>
+          </a:fontRef>
+        </p:style>
+      </p:cxnSp>
     </p:spTree>
     <p:extLst>
       <p:ext uri="{BB962C8B-B14F-4D97-AF65-F5344CB8AC3E}">

</xml_diff>

<commit_message>
update MSS to EPN design
</commit_message>
<xml_diff>
--- a/reports/EPN Design.pptx
+++ b/reports/EPN Design.pptx
@@ -3155,7 +3155,7 @@
         </p:nvSpPr>
         <p:spPr>
           <a:xfrm>
-            <a:off x="567872" y="1907019"/>
+            <a:off x="567872" y="1689294"/>
             <a:ext cx="1068920" cy="566057"/>
           </a:xfrm>
           <a:prstGeom prst="roundRect">
@@ -3196,7 +3196,7 @@
         </p:nvSpPr>
         <p:spPr>
           <a:xfrm rot="5400000">
-            <a:off x="1523580" y="2097603"/>
+            <a:off x="1523580" y="1879878"/>
             <a:ext cx="226423" cy="184888"/>
           </a:xfrm>
           <a:prstGeom prst="triangle">
@@ -3239,7 +3239,7 @@
         </p:nvSpPr>
         <p:spPr>
           <a:xfrm>
-            <a:off x="567872" y="1907019"/>
+            <a:off x="567872" y="1689294"/>
             <a:ext cx="338554" cy="215444"/>
           </a:xfrm>
           <a:prstGeom prst="rect">
@@ -3269,7 +3269,7 @@
         </p:nvSpPr>
         <p:spPr>
           <a:xfrm>
-            <a:off x="594019" y="2076835"/>
+            <a:off x="594019" y="1859110"/>
             <a:ext cx="950327" cy="400110"/>
           </a:xfrm>
           <a:prstGeom prst="rect">
@@ -3299,7 +3299,7 @@
         </p:nvSpPr>
         <p:spPr>
           <a:xfrm>
-            <a:off x="10430507" y="2345498"/>
+            <a:off x="10430507" y="2223572"/>
             <a:ext cx="1068920" cy="566057"/>
           </a:xfrm>
           <a:prstGeom prst="roundRect">
@@ -3340,7 +3340,7 @@
         </p:nvSpPr>
         <p:spPr>
           <a:xfrm rot="5400000">
-            <a:off x="10317294" y="2602236"/>
+            <a:off x="10317294" y="2480310"/>
             <a:ext cx="226423" cy="184888"/>
           </a:xfrm>
           <a:prstGeom prst="triangle">
@@ -3383,7 +3383,7 @@
         </p:nvSpPr>
         <p:spPr>
           <a:xfrm>
-            <a:off x="10430507" y="2345498"/>
+            <a:off x="10430507" y="2223572"/>
             <a:ext cx="340158" cy="215444"/>
           </a:xfrm>
           <a:prstGeom prst="rect">
@@ -3413,7 +3413,7 @@
         </p:nvSpPr>
         <p:spPr>
           <a:xfrm>
-            <a:off x="10462360" y="2930605"/>
+            <a:off x="10462360" y="2808679"/>
             <a:ext cx="1287153" cy="461665"/>
           </a:xfrm>
           <a:prstGeom prst="rect">
@@ -3441,7 +3441,7 @@
         </p:nvSpPr>
         <p:spPr>
           <a:xfrm>
-            <a:off x="3779769" y="796596"/>
+            <a:off x="3779769" y="665961"/>
             <a:ext cx="1632857" cy="870525"/>
           </a:xfrm>
           <a:prstGeom prst="roundRect">
@@ -3482,7 +3482,7 @@
         </p:nvSpPr>
         <p:spPr>
           <a:xfrm>
-            <a:off x="3778338" y="792023"/>
+            <a:off x="3778338" y="661388"/>
             <a:ext cx="1236236" cy="215444"/>
           </a:xfrm>
           <a:prstGeom prst="rect">
@@ -3512,7 +3512,7 @@
         </p:nvSpPr>
         <p:spPr>
           <a:xfrm rot="5400000">
-            <a:off x="3692705" y="1033990"/>
+            <a:off x="3692705" y="903355"/>
             <a:ext cx="226423" cy="184888"/>
           </a:xfrm>
           <a:prstGeom prst="triangle">
@@ -3551,14 +3551,15 @@
         <p:nvCxnSpPr>
           <p:cNvPr id="26" name="Straight Connector 25"/>
           <p:cNvCxnSpPr>
+            <a:stCxn id="106" idx="0"/>
             <a:endCxn id="32" idx="3"/>
           </p:cNvCxnSpPr>
           <p:nvPr/>
         </p:nvCxnSpPr>
         <p:spPr>
           <a:xfrm>
-            <a:off x="5552224" y="1118814"/>
-            <a:ext cx="1609040" cy="9370"/>
+            <a:off x="5552224" y="829940"/>
+            <a:ext cx="1601369" cy="18251"/>
           </a:xfrm>
           <a:prstGeom prst="line">
             <a:avLst/>
@@ -3587,7 +3588,7 @@
         </p:nvSpPr>
         <p:spPr>
           <a:xfrm>
-            <a:off x="7218567" y="812467"/>
+            <a:off x="7218567" y="620869"/>
             <a:ext cx="1632857" cy="882723"/>
           </a:xfrm>
           <a:prstGeom prst="roundRect">
@@ -3628,7 +3629,7 @@
         </p:nvSpPr>
         <p:spPr>
           <a:xfrm rot="5400000">
-            <a:off x="8785366" y="1035739"/>
+            <a:off x="8785366" y="844141"/>
             <a:ext cx="226423" cy="184888"/>
           </a:xfrm>
           <a:prstGeom prst="triangle">
@@ -3671,7 +3672,7 @@
         </p:nvSpPr>
         <p:spPr>
           <a:xfrm rot="5400000">
-            <a:off x="7140496" y="1035739"/>
+            <a:off x="7132825" y="755746"/>
             <a:ext cx="226423" cy="184888"/>
           </a:xfrm>
           <a:prstGeom prst="triangle">
@@ -3714,7 +3715,7 @@
         </p:nvSpPr>
         <p:spPr>
           <a:xfrm>
-            <a:off x="7369239" y="2028920"/>
+            <a:off x="7369239" y="1750232"/>
             <a:ext cx="1387040" cy="1061829"/>
           </a:xfrm>
           <a:prstGeom prst="rect">
@@ -3778,7 +3779,7 @@
         </p:nvSpPr>
         <p:spPr>
           <a:xfrm>
-            <a:off x="562179" y="3538383"/>
+            <a:off x="562179" y="3303240"/>
             <a:ext cx="1068920" cy="566057"/>
           </a:xfrm>
           <a:prstGeom prst="roundRect">
@@ -3819,7 +3820,7 @@
         </p:nvSpPr>
         <p:spPr>
           <a:xfrm rot="5400000">
-            <a:off x="1517887" y="3728967"/>
+            <a:off x="1517887" y="3493824"/>
             <a:ext cx="226423" cy="184888"/>
           </a:xfrm>
           <a:prstGeom prst="triangle">
@@ -3862,7 +3863,7 @@
         </p:nvSpPr>
         <p:spPr>
           <a:xfrm>
-            <a:off x="562179" y="3538383"/>
+            <a:off x="562179" y="3303240"/>
             <a:ext cx="338554" cy="215444"/>
           </a:xfrm>
           <a:prstGeom prst="rect">
@@ -3892,7 +3893,7 @@
         </p:nvSpPr>
         <p:spPr>
           <a:xfrm>
-            <a:off x="588326" y="3708199"/>
+            <a:off x="588326" y="3473056"/>
             <a:ext cx="950327" cy="400110"/>
           </a:xfrm>
           <a:prstGeom prst="rect">
@@ -3926,7 +3927,7 @@
         </p:nvSpPr>
         <p:spPr>
           <a:xfrm>
-            <a:off x="7357377" y="895855"/>
+            <a:off x="7357377" y="704257"/>
             <a:ext cx="1455764" cy="784830"/>
           </a:xfrm>
           <a:prstGeom prst="rect">
@@ -3963,7 +3964,7 @@
         </p:nvSpPr>
         <p:spPr>
           <a:xfrm>
-            <a:off x="1960560" y="1958449"/>
+            <a:off x="1960560" y="1740724"/>
             <a:ext cx="774943" cy="467052"/>
           </a:xfrm>
           <a:prstGeom prst="hexagon">
@@ -4006,7 +4007,7 @@
         </p:nvCxnSpPr>
         <p:spPr>
           <a:xfrm>
-            <a:off x="1729236" y="2190048"/>
+            <a:off x="1729236" y="1972323"/>
             <a:ext cx="290614" cy="1895"/>
           </a:xfrm>
           <a:prstGeom prst="line">
@@ -4036,7 +4037,7 @@
         </p:nvSpPr>
         <p:spPr>
           <a:xfrm>
-            <a:off x="2064052" y="2081641"/>
+            <a:off x="2064052" y="1863916"/>
             <a:ext cx="579005" cy="215444"/>
           </a:xfrm>
           <a:prstGeom prst="rect">
@@ -4069,8 +4070,8 @@
         </p:nvCxnSpPr>
         <p:spPr>
           <a:xfrm>
-            <a:off x="8991022" y="1128184"/>
-            <a:ext cx="1347040" cy="1566497"/>
+            <a:off x="8991022" y="936586"/>
+            <a:ext cx="1347040" cy="1636169"/>
           </a:xfrm>
           <a:prstGeom prst="bentConnector3">
             <a:avLst/>
@@ -4099,7 +4100,7 @@
         </p:nvSpPr>
         <p:spPr>
           <a:xfrm>
-            <a:off x="7239933" y="1935028"/>
+            <a:off x="7239933" y="1656340"/>
             <a:ext cx="1632857" cy="1192934"/>
           </a:xfrm>
           <a:prstGeom prst="roundRect">
@@ -4140,7 +4141,7 @@
         </p:nvSpPr>
         <p:spPr>
           <a:xfrm rot="5400000">
-            <a:off x="8806732" y="2190362"/>
+            <a:off x="8806732" y="1911674"/>
             <a:ext cx="226423" cy="184888"/>
           </a:xfrm>
           <a:prstGeom prst="triangle">
@@ -4183,7 +4184,7 @@
         </p:nvSpPr>
         <p:spPr>
           <a:xfrm rot="5400000">
-            <a:off x="7161862" y="2216489"/>
+            <a:off x="7161862" y="1937801"/>
             <a:ext cx="226423" cy="184888"/>
           </a:xfrm>
           <a:prstGeom prst="triangle">
@@ -4229,12 +4230,12 @@
         </p:nvCxnSpPr>
         <p:spPr>
           <a:xfrm>
-            <a:off x="9012388" y="2282807"/>
-            <a:ext cx="1325674" cy="411874"/>
+            <a:off x="9012388" y="2004119"/>
+            <a:ext cx="1325674" cy="568636"/>
           </a:xfrm>
           <a:prstGeom prst="bentConnector3">
             <a:avLst>
-              <a:gd name="adj1" fmla="val 50000"/>
+              <a:gd name="adj1" fmla="val 49343"/>
             </a:avLst>
           </a:prstGeom>
         </p:spPr>
@@ -4261,7 +4262,7 @@
         </p:nvSpPr>
         <p:spPr>
           <a:xfrm>
-            <a:off x="3740435" y="1851001"/>
+            <a:off x="3740435" y="1633276"/>
             <a:ext cx="1632857" cy="1246036"/>
           </a:xfrm>
           <a:prstGeom prst="roundRect">
@@ -4302,7 +4303,7 @@
         </p:nvSpPr>
         <p:spPr>
           <a:xfrm>
-            <a:off x="3796501" y="1873623"/>
+            <a:off x="3796501" y="1655898"/>
             <a:ext cx="1236236" cy="215444"/>
           </a:xfrm>
           <a:prstGeom prst="rect">
@@ -4332,7 +4333,7 @@
         </p:nvSpPr>
         <p:spPr>
           <a:xfrm rot="5400000">
-            <a:off x="3659002" y="2223602"/>
+            <a:off x="3659002" y="2005877"/>
             <a:ext cx="226423" cy="184888"/>
           </a:xfrm>
           <a:prstGeom prst="triangle">
@@ -4375,7 +4376,7 @@
         </p:nvSpPr>
         <p:spPr>
           <a:xfrm rot="5400000">
-            <a:off x="5304696" y="2217520"/>
+            <a:off x="5304696" y="1947541"/>
             <a:ext cx="226423" cy="184888"/>
           </a:xfrm>
           <a:prstGeom prst="triangle">
@@ -4418,7 +4419,7 @@
         </p:nvSpPr>
         <p:spPr>
           <a:xfrm>
-            <a:off x="5408538" y="2094137"/>
+            <a:off x="5408538" y="1824158"/>
             <a:ext cx="482824" cy="215444"/>
           </a:xfrm>
           <a:prstGeom prst="rect">
@@ -4451,7 +4452,7 @@
         </p:nvCxnSpPr>
         <p:spPr>
           <a:xfrm>
-            <a:off x="2735503" y="2191975"/>
+            <a:off x="2735503" y="1974250"/>
             <a:ext cx="944267" cy="124072"/>
           </a:xfrm>
           <a:prstGeom prst="bentConnector3">
@@ -4483,7 +4484,7 @@
         </p:nvSpPr>
         <p:spPr>
           <a:xfrm>
-            <a:off x="3939107" y="988495"/>
+            <a:off x="3939107" y="857860"/>
             <a:ext cx="1722405" cy="646331"/>
           </a:xfrm>
           <a:prstGeom prst="rect">
@@ -4528,8 +4529,8 @@
         </p:nvCxnSpPr>
         <p:spPr>
           <a:xfrm flipV="1">
-            <a:off x="5510352" y="2308934"/>
-            <a:ext cx="1672278" cy="1031"/>
+            <a:off x="5510352" y="2030246"/>
+            <a:ext cx="1672278" cy="9740"/>
           </a:xfrm>
           <a:prstGeom prst="line">
             <a:avLst/>
@@ -4561,8 +4562,8 @@
         </p:nvCxnSpPr>
         <p:spPr>
           <a:xfrm flipV="1">
-            <a:off x="9016708" y="2694681"/>
-            <a:ext cx="1321354" cy="855961"/>
+            <a:off x="8999290" y="2572755"/>
+            <a:ext cx="1338772" cy="690490"/>
           </a:xfrm>
           <a:prstGeom prst="bentConnector3">
             <a:avLst/>
@@ -4594,11 +4595,13 @@
         </p:nvCxnSpPr>
         <p:spPr>
           <a:xfrm flipV="1">
-            <a:off x="9036312" y="2694681"/>
-            <a:ext cx="1301750" cy="3243645"/>
+            <a:off x="9036312" y="2572755"/>
+            <a:ext cx="1301750" cy="3539751"/>
           </a:xfrm>
           <a:prstGeom prst="bentConnector3">
-            <a:avLst/>
+            <a:avLst>
+              <a:gd name="adj1" fmla="val 47993"/>
+            </a:avLst>
           </a:prstGeom>
         </p:spPr>
         <p:style>
@@ -4624,7 +4627,7 @@
         </p:nvSpPr>
         <p:spPr>
           <a:xfrm>
-            <a:off x="3945570" y="1989261"/>
+            <a:off x="3945570" y="1771536"/>
             <a:ext cx="1722405" cy="1200329"/>
           </a:xfrm>
           <a:prstGeom prst="rect">
@@ -4688,7 +4691,7 @@
         </p:nvSpPr>
         <p:spPr>
           <a:xfrm rot="5400000">
-            <a:off x="5348512" y="1033533"/>
+            <a:off x="5346568" y="737495"/>
             <a:ext cx="226423" cy="184888"/>
           </a:xfrm>
           <a:prstGeom prst="triangle">
@@ -4731,7 +4734,7 @@
         </p:nvSpPr>
         <p:spPr>
           <a:xfrm rot="5400000">
-            <a:off x="5310029" y="2675102"/>
+            <a:off x="5310029" y="2457377"/>
             <a:ext cx="226423" cy="184888"/>
           </a:xfrm>
           <a:prstGeom prst="triangle">
@@ -4774,7 +4777,7 @@
         </p:nvSpPr>
         <p:spPr>
           <a:xfrm>
-            <a:off x="5452354" y="910150"/>
+            <a:off x="5408538" y="710472"/>
             <a:ext cx="482824" cy="215444"/>
           </a:xfrm>
           <a:prstGeom prst="rect">
@@ -4804,7 +4807,7 @@
         </p:nvSpPr>
         <p:spPr>
           <a:xfrm>
-            <a:off x="5401988" y="2798416"/>
+            <a:off x="5401988" y="2580691"/>
             <a:ext cx="716863" cy="215444"/>
           </a:xfrm>
           <a:prstGeom prst="rect">
@@ -4837,7 +4840,7 @@
         </p:nvCxnSpPr>
         <p:spPr>
           <a:xfrm>
-            <a:off x="1723543" y="3821412"/>
+            <a:off x="1723543" y="3586269"/>
             <a:ext cx="1986507" cy="6293"/>
           </a:xfrm>
           <a:prstGeom prst="line">
@@ -4867,7 +4870,7 @@
         </p:nvSpPr>
         <p:spPr>
           <a:xfrm>
-            <a:off x="3768589" y="3200608"/>
+            <a:off x="3768589" y="2965465"/>
             <a:ext cx="1632857" cy="885894"/>
           </a:xfrm>
           <a:prstGeom prst="roundRect">
@@ -4908,7 +4911,7 @@
         </p:nvSpPr>
         <p:spPr>
           <a:xfrm>
-            <a:off x="3816752" y="3246887"/>
+            <a:off x="3816752" y="3011744"/>
             <a:ext cx="1117614" cy="215444"/>
           </a:xfrm>
           <a:prstGeom prst="rect">
@@ -4938,7 +4941,7 @@
         </p:nvSpPr>
         <p:spPr>
           <a:xfrm rot="5400000">
-            <a:off x="3689282" y="3735260"/>
+            <a:off x="3689282" y="3500117"/>
             <a:ext cx="226423" cy="184888"/>
           </a:xfrm>
           <a:prstGeom prst="triangle">
@@ -4981,7 +4984,7 @@
         </p:nvSpPr>
         <p:spPr>
           <a:xfrm rot="5400000">
-            <a:off x="5332850" y="3354093"/>
+            <a:off x="5332850" y="3118950"/>
             <a:ext cx="226423" cy="184888"/>
           </a:xfrm>
           <a:prstGeom prst="triangle">
@@ -5024,7 +5027,7 @@
         </p:nvSpPr>
         <p:spPr>
           <a:xfrm rot="5400000">
-            <a:off x="5339430" y="3768069"/>
+            <a:off x="5339430" y="3532926"/>
             <a:ext cx="226423" cy="184888"/>
           </a:xfrm>
           <a:prstGeom prst="triangle">
@@ -5067,7 +5070,7 @@
         </p:nvSpPr>
         <p:spPr>
           <a:xfrm>
-            <a:off x="5436692" y="3230710"/>
+            <a:off x="5436692" y="2995567"/>
             <a:ext cx="482824" cy="215444"/>
           </a:xfrm>
           <a:prstGeom prst="rect">
@@ -5097,7 +5100,7 @@
         </p:nvSpPr>
         <p:spPr>
           <a:xfrm>
-            <a:off x="5431389" y="3891383"/>
+            <a:off x="5431389" y="3656240"/>
             <a:ext cx="716863" cy="215444"/>
           </a:xfrm>
           <a:prstGeom prst="rect">
@@ -5127,7 +5130,7 @@
         </p:nvSpPr>
         <p:spPr>
           <a:xfrm>
-            <a:off x="3887032" y="3430767"/>
+            <a:off x="3887032" y="3195624"/>
             <a:ext cx="1722405" cy="507831"/>
           </a:xfrm>
           <a:prstGeom prst="rect">
@@ -5167,7 +5170,7 @@
         </p:nvSpPr>
         <p:spPr>
           <a:xfrm rot="5400000">
-            <a:off x="3671979" y="3333829"/>
+            <a:off x="3671979" y="3098686"/>
             <a:ext cx="226423" cy="184888"/>
           </a:xfrm>
           <a:prstGeom prst="triangle">
@@ -5213,8 +5216,8 @@
         </p:nvCxnSpPr>
         <p:spPr>
           <a:xfrm>
-            <a:off x="2735503" y="2191975"/>
-            <a:ext cx="957244" cy="1234299"/>
+            <a:off x="2735503" y="1974250"/>
+            <a:ext cx="957244" cy="1216881"/>
           </a:xfrm>
           <a:prstGeom prst="bentConnector3">
             <a:avLst>
@@ -5245,7 +5248,7 @@
         </p:nvSpPr>
         <p:spPr>
           <a:xfrm>
-            <a:off x="7364142" y="3481880"/>
+            <a:off x="7346724" y="3194483"/>
             <a:ext cx="1326513" cy="507831"/>
           </a:xfrm>
           <a:prstGeom prst="rect">
@@ -5273,7 +5276,7 @@
         </p:nvSpPr>
         <p:spPr>
           <a:xfrm>
-            <a:off x="7253707" y="3257347"/>
+            <a:off x="7236289" y="2969950"/>
             <a:ext cx="1632857" cy="885894"/>
           </a:xfrm>
           <a:prstGeom prst="roundRect">
@@ -5314,7 +5317,7 @@
         </p:nvSpPr>
         <p:spPr>
           <a:xfrm rot="5400000">
-            <a:off x="8811052" y="3458197"/>
+            <a:off x="8793634" y="3170800"/>
             <a:ext cx="226423" cy="184888"/>
           </a:xfrm>
           <a:prstGeom prst="triangle">
@@ -5357,7 +5360,7 @@
         </p:nvSpPr>
         <p:spPr>
           <a:xfrm rot="5400000">
-            <a:off x="7175636" y="3360846"/>
+            <a:off x="7158218" y="3125703"/>
             <a:ext cx="226423" cy="184888"/>
           </a:xfrm>
           <a:prstGeom prst="triangle">
@@ -5403,8 +5406,8 @@
         </p:nvCxnSpPr>
         <p:spPr>
           <a:xfrm>
-            <a:off x="5538506" y="3446538"/>
-            <a:ext cx="1657898" cy="6753"/>
+            <a:off x="5538506" y="3211395"/>
+            <a:ext cx="1640480" cy="6753"/>
           </a:xfrm>
           <a:prstGeom prst="line">
             <a:avLst/>
@@ -5433,7 +5436,7 @@
         </p:nvSpPr>
         <p:spPr>
           <a:xfrm>
-            <a:off x="566367" y="5552714"/>
+            <a:off x="566367" y="5726894"/>
             <a:ext cx="1068920" cy="566057"/>
           </a:xfrm>
           <a:prstGeom prst="roundRect">
@@ -5474,7 +5477,7 @@
         </p:nvSpPr>
         <p:spPr>
           <a:xfrm rot="5400000">
-            <a:off x="1522075" y="5743298"/>
+            <a:off x="1522075" y="5917478"/>
             <a:ext cx="226423" cy="184888"/>
           </a:xfrm>
           <a:prstGeom prst="triangle">
@@ -5517,7 +5520,7 @@
         </p:nvSpPr>
         <p:spPr>
           <a:xfrm>
-            <a:off x="566367" y="5552714"/>
+            <a:off x="566367" y="5726894"/>
             <a:ext cx="338554" cy="215444"/>
           </a:xfrm>
           <a:prstGeom prst="rect">
@@ -5533,7 +5536,7 @@
           <a:p>
             <a:r>
               <a:rPr lang="en-US" sz="800" dirty="0"/>
-              <a:t>EP5</a:t>
+              <a:t>EP6</a:t>
             </a:r>
             <a:endParaRPr lang="en-SG" sz="800" dirty="0"/>
           </a:p>
@@ -5547,7 +5550,7 @@
         </p:nvSpPr>
         <p:spPr>
           <a:xfrm>
-            <a:off x="592514" y="5722530"/>
+            <a:off x="592514" y="5896710"/>
             <a:ext cx="1016625" cy="246221"/>
           </a:xfrm>
           <a:prstGeom prst="rect">
@@ -5580,7 +5583,7 @@
         </p:nvCxnSpPr>
         <p:spPr>
           <a:xfrm>
-            <a:off x="1727731" y="5835743"/>
+            <a:off x="1727731" y="6009923"/>
             <a:ext cx="1965016" cy="13969"/>
           </a:xfrm>
           <a:prstGeom prst="line">
@@ -5610,7 +5613,7 @@
         </p:nvSpPr>
         <p:spPr>
           <a:xfrm>
-            <a:off x="3768589" y="5624046"/>
+            <a:off x="3768589" y="5798226"/>
             <a:ext cx="1632857" cy="885894"/>
           </a:xfrm>
           <a:prstGeom prst="roundRect">
@@ -5651,7 +5654,7 @@
         </p:nvSpPr>
         <p:spPr>
           <a:xfrm>
-            <a:off x="3816752" y="5670325"/>
+            <a:off x="3816752" y="5844505"/>
             <a:ext cx="662361" cy="215444"/>
           </a:xfrm>
           <a:prstGeom prst="rect">
@@ -5667,7 +5670,7 @@
           <a:p>
             <a:r>
               <a:rPr lang="en-US" sz="800" dirty="0"/>
-              <a:t>EPA4: Filter</a:t>
+              <a:t>EPA5: Filter</a:t>
             </a:r>
             <a:endParaRPr lang="en-SG" sz="800" dirty="0"/>
           </a:p>
@@ -5681,7 +5684,7 @@
         </p:nvSpPr>
         <p:spPr>
           <a:xfrm rot="5400000">
-            <a:off x="3689282" y="6158698"/>
+            <a:off x="3689282" y="6332878"/>
             <a:ext cx="226423" cy="184888"/>
           </a:xfrm>
           <a:prstGeom prst="triangle">
@@ -5724,7 +5727,7 @@
         </p:nvSpPr>
         <p:spPr>
           <a:xfrm rot="5400000">
-            <a:off x="3671979" y="5757267"/>
+            <a:off x="3671979" y="5931447"/>
             <a:ext cx="226423" cy="184888"/>
           </a:xfrm>
           <a:prstGeom prst="triangle">
@@ -5767,7 +5770,7 @@
         </p:nvSpPr>
         <p:spPr>
           <a:xfrm rot="5400000">
-            <a:off x="5318177" y="5680114"/>
+            <a:off x="5318177" y="5854294"/>
             <a:ext cx="226423" cy="184888"/>
           </a:xfrm>
           <a:prstGeom prst="triangle">
@@ -5810,7 +5813,7 @@
         </p:nvSpPr>
         <p:spPr>
           <a:xfrm rot="5400000">
-            <a:off x="5329534" y="6016905"/>
+            <a:off x="5329534" y="6191085"/>
             <a:ext cx="226423" cy="184888"/>
           </a:xfrm>
           <a:prstGeom prst="triangle">
@@ -5853,7 +5856,7 @@
         </p:nvSpPr>
         <p:spPr>
           <a:xfrm rot="5400000">
-            <a:off x="5318177" y="6336139"/>
+            <a:off x="5318177" y="6510319"/>
             <a:ext cx="226423" cy="184888"/>
           </a:xfrm>
           <a:prstGeom prst="triangle">
@@ -5896,7 +5899,7 @@
         </p:nvSpPr>
         <p:spPr>
           <a:xfrm>
-            <a:off x="5427073" y="5520866"/>
+            <a:off x="5427073" y="5695046"/>
             <a:ext cx="502061" cy="215444"/>
           </a:xfrm>
           <a:prstGeom prst="rect">
@@ -5926,7 +5929,7 @@
         </p:nvSpPr>
         <p:spPr>
           <a:xfrm>
-            <a:off x="5432810" y="5903327"/>
+            <a:off x="5432810" y="6077507"/>
             <a:ext cx="577402" cy="215444"/>
           </a:xfrm>
           <a:prstGeom prst="rect">
@@ -5956,7 +5959,7 @@
         </p:nvSpPr>
         <p:spPr>
           <a:xfrm>
-            <a:off x="5386692" y="6461513"/>
+            <a:off x="5386692" y="6635693"/>
             <a:ext cx="771365" cy="215444"/>
           </a:xfrm>
           <a:prstGeom prst="rect">
@@ -5986,7 +5989,7 @@
         </p:nvSpPr>
         <p:spPr>
           <a:xfrm>
-            <a:off x="7350368" y="5820469"/>
+            <a:off x="7350368" y="5994649"/>
             <a:ext cx="1326513" cy="646331"/>
           </a:xfrm>
           <a:prstGeom prst="rect">
@@ -6024,7 +6027,7 @@
         </p:nvSpPr>
         <p:spPr>
           <a:xfrm>
-            <a:off x="7239933" y="5595936"/>
+            <a:off x="7239933" y="5770116"/>
             <a:ext cx="1632857" cy="885894"/>
           </a:xfrm>
           <a:prstGeom prst="roundRect">
@@ -6065,7 +6068,7 @@
         </p:nvSpPr>
         <p:spPr>
           <a:xfrm rot="5400000">
-            <a:off x="8830656" y="5845881"/>
+            <a:off x="8830656" y="6020061"/>
             <a:ext cx="226423" cy="184888"/>
           </a:xfrm>
           <a:prstGeom prst="triangle">
@@ -6108,7 +6111,7 @@
         </p:nvSpPr>
         <p:spPr>
           <a:xfrm rot="5400000">
-            <a:off x="7161862" y="5699435"/>
+            <a:off x="7161862" y="5873615"/>
             <a:ext cx="226423" cy="184888"/>
           </a:xfrm>
           <a:prstGeom prst="triangle">
@@ -6151,7 +6154,7 @@
         </p:nvSpPr>
         <p:spPr>
           <a:xfrm>
-            <a:off x="3863706" y="5915418"/>
+            <a:off x="3863706" y="6089598"/>
             <a:ext cx="1722405" cy="369332"/>
           </a:xfrm>
           <a:prstGeom prst="rect">
@@ -6182,7 +6185,7 @@
         </p:nvCxnSpPr>
         <p:spPr>
           <a:xfrm>
-            <a:off x="5523833" y="5772559"/>
+            <a:off x="5523833" y="5946739"/>
             <a:ext cx="1658797" cy="19321"/>
           </a:xfrm>
           <a:prstGeom prst="line">
@@ -6212,7 +6215,7 @@
         </p:nvSpPr>
         <p:spPr>
           <a:xfrm>
-            <a:off x="2292751" y="5161830"/>
+            <a:off x="2292751" y="5487287"/>
             <a:ext cx="6959246" cy="276999"/>
           </a:xfrm>
           <a:prstGeom prst="rect">
@@ -6268,7 +6271,7 @@
         </p:nvSpPr>
         <p:spPr>
           <a:xfrm>
-            <a:off x="6206187" y="3682265"/>
+            <a:off x="6206187" y="3325191"/>
             <a:ext cx="615863" cy="804643"/>
           </a:xfrm>
           <a:prstGeom prst="can">
@@ -6309,7 +6312,7 @@
         </p:nvSpPr>
         <p:spPr>
           <a:xfrm>
-            <a:off x="6191749" y="3864703"/>
+            <a:off x="6191749" y="3629560"/>
             <a:ext cx="630301" cy="461665"/>
           </a:xfrm>
           <a:prstGeom prst="rect">
@@ -6347,14 +6350,15 @@
         <p:nvCxnSpPr>
           <p:cNvPr id="16" name="Connector: Elbow 15"/>
           <p:cNvCxnSpPr>
+            <a:stCxn id="111" idx="0"/>
             <a:endCxn id="73" idx="1"/>
           </p:cNvCxnSpPr>
           <p:nvPr/>
         </p:nvCxnSpPr>
         <p:spPr>
           <a:xfrm rot="5400000" flipH="1" flipV="1">
-            <a:off x="6041371" y="3004244"/>
-            <a:ext cx="1671310" cy="725813"/>
+            <a:off x="6185040" y="2574668"/>
+            <a:ext cx="1376753" cy="733033"/>
           </a:xfrm>
           <a:prstGeom prst="bentConnector2">
             <a:avLst/>
@@ -6383,14 +6387,15 @@
         <p:nvCxnSpPr>
           <p:cNvPr id="22" name="Connector: Elbow 21"/>
           <p:cNvCxnSpPr>
+            <a:stCxn id="111" idx="0"/>
             <a:endCxn id="27" idx="1"/>
           </p:cNvCxnSpPr>
           <p:nvPr/>
         </p:nvCxnSpPr>
         <p:spPr>
           <a:xfrm rot="5400000" flipH="1" flipV="1">
-            <a:off x="5391855" y="2376094"/>
-            <a:ext cx="2948976" cy="704447"/>
+            <a:off x="5579069" y="1990063"/>
+            <a:ext cx="2567329" cy="711667"/>
           </a:xfrm>
           <a:prstGeom prst="bentConnector2">
             <a:avLst/>
@@ -6423,7 +6428,7 @@
         </p:nvSpPr>
         <p:spPr>
           <a:xfrm>
-            <a:off x="589965" y="937798"/>
+            <a:off x="589965" y="815872"/>
             <a:ext cx="1068920" cy="566057"/>
           </a:xfrm>
           <a:prstGeom prst="roundRect">
@@ -6464,7 +6469,7 @@
         </p:nvSpPr>
         <p:spPr>
           <a:xfrm rot="5400000">
-            <a:off x="1610772" y="1016603"/>
+            <a:off x="1610772" y="894677"/>
             <a:ext cx="226423" cy="184888"/>
           </a:xfrm>
           <a:prstGeom prst="triangle">
@@ -6504,13 +6509,14 @@
           <p:cNvPr id="119" name="Straight Connector 118"/>
           <p:cNvCxnSpPr>
             <a:stCxn id="117" idx="0"/>
+            <a:endCxn id="21" idx="3"/>
           </p:cNvCxnSpPr>
           <p:nvPr/>
         </p:nvCxnSpPr>
         <p:spPr>
           <a:xfrm>
-            <a:off x="1816428" y="1109048"/>
-            <a:ext cx="1882795" cy="34389"/>
+            <a:off x="1816428" y="987122"/>
+            <a:ext cx="1897045" cy="8678"/>
           </a:xfrm>
           <a:prstGeom prst="line">
             <a:avLst/>
@@ -6539,7 +6545,7 @@
         </p:nvSpPr>
         <p:spPr>
           <a:xfrm>
-            <a:off x="601335" y="939232"/>
+            <a:off x="601335" y="817306"/>
             <a:ext cx="338554" cy="215444"/>
           </a:xfrm>
           <a:prstGeom prst="rect">
@@ -6569,7 +6575,7 @@
         </p:nvSpPr>
         <p:spPr>
           <a:xfrm>
-            <a:off x="627482" y="1109048"/>
+            <a:off x="627482" y="987122"/>
             <a:ext cx="950327" cy="400110"/>
           </a:xfrm>
           <a:prstGeom prst="rect">
@@ -6599,7 +6605,7 @@
         </p:nvSpPr>
         <p:spPr>
           <a:xfrm>
-            <a:off x="575188" y="4264486"/>
+            <a:off x="575188" y="4839269"/>
             <a:ext cx="1068920" cy="566057"/>
           </a:xfrm>
           <a:prstGeom prst="roundRect">
@@ -6640,7 +6646,7 @@
         </p:nvSpPr>
         <p:spPr>
           <a:xfrm rot="5400000">
-            <a:off x="1530896" y="4455071"/>
+            <a:off x="1530896" y="5029854"/>
             <a:ext cx="226423" cy="184888"/>
           </a:xfrm>
           <a:prstGeom prst="triangle">
@@ -6683,7 +6689,7 @@
         </p:nvSpPr>
         <p:spPr>
           <a:xfrm>
-            <a:off x="575188" y="4264486"/>
+            <a:off x="575188" y="4839269"/>
             <a:ext cx="338554" cy="215444"/>
           </a:xfrm>
           <a:prstGeom prst="rect">
@@ -6699,7 +6705,7 @@
           <a:p>
             <a:r>
               <a:rPr lang="en-US" sz="800" dirty="0"/>
-              <a:t>EP4</a:t>
+              <a:t>EP5</a:t>
             </a:r>
             <a:endParaRPr lang="en-SG" sz="800" dirty="0"/>
           </a:p>
@@ -6713,7 +6719,7 @@
         </p:nvSpPr>
         <p:spPr>
           <a:xfrm>
-            <a:off x="601335" y="4434302"/>
+            <a:off x="601335" y="5009085"/>
             <a:ext cx="950327" cy="400110"/>
           </a:xfrm>
           <a:prstGeom prst="rect">
@@ -6743,7 +6749,7 @@
         </p:nvSpPr>
         <p:spPr>
           <a:xfrm>
-            <a:off x="7396797" y="4603131"/>
+            <a:off x="7344543" y="4907938"/>
             <a:ext cx="1326513" cy="369332"/>
           </a:xfrm>
           <a:prstGeom prst="rect">
@@ -6771,8 +6777,8 @@
         </p:nvSpPr>
         <p:spPr>
           <a:xfrm>
-            <a:off x="7286362" y="4378598"/>
-            <a:ext cx="1632857" cy="784293"/>
+            <a:off x="7234108" y="4839270"/>
+            <a:ext cx="1632857" cy="578778"/>
           </a:xfrm>
           <a:prstGeom prst="roundRect">
             <a:avLst/>
@@ -6812,7 +6818,7 @@
         </p:nvSpPr>
         <p:spPr>
           <a:xfrm rot="5400000">
-            <a:off x="8843707" y="4579448"/>
+            <a:off x="8791453" y="4988763"/>
             <a:ext cx="226423" cy="184888"/>
           </a:xfrm>
           <a:prstGeom prst="triangle">
@@ -6855,7 +6861,7 @@
         </p:nvSpPr>
         <p:spPr>
           <a:xfrm rot="5400000">
-            <a:off x="7208291" y="4482097"/>
+            <a:off x="7156457" y="5049721"/>
             <a:ext cx="226423" cy="184888"/>
           </a:xfrm>
           <a:prstGeom prst="triangle">
@@ -6901,8 +6907,8 @@
         </p:nvCxnSpPr>
         <p:spPr>
           <a:xfrm>
-            <a:off x="1736552" y="4547516"/>
-            <a:ext cx="5492507" cy="27026"/>
+            <a:off x="1736552" y="5122299"/>
+            <a:ext cx="5440673" cy="19867"/>
           </a:xfrm>
           <a:prstGeom prst="line">
             <a:avLst/>
@@ -6934,11 +6940,599 @@
         </p:nvCxnSpPr>
         <p:spPr>
           <a:xfrm flipV="1">
-            <a:off x="9049363" y="2694681"/>
-            <a:ext cx="1288699" cy="1977212"/>
+            <a:off x="8997109" y="2572755"/>
+            <a:ext cx="1340953" cy="2508453"/>
           </a:xfrm>
           <a:prstGeom prst="bentConnector3">
             <a:avLst/>
+          </a:prstGeom>
+          <a:ln>
+            <a:tailEnd type="triangle"/>
+          </a:ln>
+        </p:spPr>
+        <p:style>
+          <a:lnRef idx="1">
+            <a:schemeClr val="accent1"/>
+          </a:lnRef>
+          <a:fillRef idx="0">
+            <a:schemeClr val="accent1"/>
+          </a:fillRef>
+          <a:effectRef idx="0">
+            <a:schemeClr val="accent1"/>
+          </a:effectRef>
+          <a:fontRef idx="minor">
+            <a:schemeClr val="tx1"/>
+          </a:fontRef>
+        </p:style>
+      </p:cxnSp>
+      <p:sp>
+        <p:nvSpPr>
+          <p:cNvPr id="121" name="Rectangle: Rounded Corners 120"/>
+          <p:cNvSpPr/>
+          <p:nvPr/>
+        </p:nvSpPr>
+        <p:spPr>
+          <a:xfrm>
+            <a:off x="562179" y="4007015"/>
+            <a:ext cx="1068920" cy="566057"/>
+          </a:xfrm>
+          <a:prstGeom prst="roundRect">
+            <a:avLst/>
+          </a:prstGeom>
+          <a:noFill/>
+        </p:spPr>
+        <p:style>
+          <a:lnRef idx="2">
+            <a:schemeClr val="accent1">
+              <a:shade val="50000"/>
+            </a:schemeClr>
+          </a:lnRef>
+          <a:fillRef idx="1">
+            <a:schemeClr val="accent1"/>
+          </a:fillRef>
+          <a:effectRef idx="0">
+            <a:schemeClr val="accent1"/>
+          </a:effectRef>
+          <a:fontRef idx="minor">
+            <a:schemeClr val="lt1"/>
+          </a:fontRef>
+        </p:style>
+        <p:txBody>
+          <a:bodyPr rtlCol="0" anchor="ctr"/>
+          <a:lstStyle/>
+          <a:p>
+            <a:pPr algn="ctr"/>
+            <a:endParaRPr lang="en-SG"/>
+          </a:p>
+        </p:txBody>
+      </p:sp>
+      <p:sp>
+        <p:nvSpPr>
+          <p:cNvPr id="126" name="TextBox 125"/>
+          <p:cNvSpPr txBox="1"/>
+          <p:nvPr/>
+        </p:nvSpPr>
+        <p:spPr>
+          <a:xfrm>
+            <a:off x="562179" y="4007015"/>
+            <a:ext cx="338554" cy="215444"/>
+          </a:xfrm>
+          <a:prstGeom prst="rect">
+            <a:avLst/>
+          </a:prstGeom>
+          <a:noFill/>
+        </p:spPr>
+        <p:txBody>
+          <a:bodyPr wrap="none" rtlCol="0">
+            <a:spAutoFit/>
+          </a:bodyPr>
+          <a:lstStyle/>
+          <a:p>
+            <a:r>
+              <a:rPr lang="en-US" sz="800" dirty="0"/>
+              <a:t>EP4</a:t>
+            </a:r>
+            <a:endParaRPr lang="en-SG" sz="800" dirty="0"/>
+          </a:p>
+        </p:txBody>
+      </p:sp>
+      <p:sp>
+        <p:nvSpPr>
+          <p:cNvPr id="127" name="TextBox 126"/>
+          <p:cNvSpPr txBox="1"/>
+          <p:nvPr/>
+        </p:nvSpPr>
+        <p:spPr>
+          <a:xfrm>
+            <a:off x="588326" y="4176831"/>
+            <a:ext cx="950327" cy="400110"/>
+          </a:xfrm>
+          <a:prstGeom prst="rect">
+            <a:avLst/>
+          </a:prstGeom>
+          <a:noFill/>
+        </p:spPr>
+        <p:txBody>
+          <a:bodyPr wrap="square" rtlCol="0">
+            <a:spAutoFit/>
+          </a:bodyPr>
+          <a:lstStyle/>
+          <a:p>
+            <a:r>
+              <a:rPr lang="en-US" sz="1000" dirty="0"/>
+              <a:t>MSS Current Rainfall</a:t>
+            </a:r>
+            <a:endParaRPr lang="en-SG" sz="1000" dirty="0"/>
+          </a:p>
+        </p:txBody>
+      </p:sp>
+      <p:sp>
+        <p:nvSpPr>
+          <p:cNvPr id="128" name="Rectangle 127"/>
+          <p:cNvSpPr/>
+          <p:nvPr/>
+        </p:nvSpPr>
+        <p:spPr>
+          <a:xfrm>
+            <a:off x="3866011" y="4179671"/>
+            <a:ext cx="1326513" cy="369332"/>
+          </a:xfrm>
+          <a:prstGeom prst="rect">
+            <a:avLst/>
+          </a:prstGeom>
+        </p:spPr>
+        <p:txBody>
+          <a:bodyPr wrap="square">
+            <a:spAutoFit/>
+          </a:bodyPr>
+          <a:lstStyle/>
+          <a:p>
+            <a:r>
+              <a:rPr lang="en-SG" sz="900" dirty="0"/>
+              <a:t>Rainfall &gt; 7.5mm in last 30 minutes</a:t>
+            </a:r>
+          </a:p>
+        </p:txBody>
+      </p:sp>
+      <p:sp>
+        <p:nvSpPr>
+          <p:cNvPr id="129" name="Rectangle: Rounded Corners 128"/>
+          <p:cNvSpPr/>
+          <p:nvPr/>
+        </p:nvSpPr>
+        <p:spPr>
+          <a:xfrm>
+            <a:off x="3755576" y="3955138"/>
+            <a:ext cx="1632857" cy="784293"/>
+          </a:xfrm>
+          <a:prstGeom prst="roundRect">
+            <a:avLst/>
+          </a:prstGeom>
+          <a:noFill/>
+        </p:spPr>
+        <p:style>
+          <a:lnRef idx="2">
+            <a:schemeClr val="accent1">
+              <a:shade val="50000"/>
+            </a:schemeClr>
+          </a:lnRef>
+          <a:fillRef idx="1">
+            <a:schemeClr val="accent1"/>
+          </a:fillRef>
+          <a:effectRef idx="0">
+            <a:schemeClr val="accent1"/>
+          </a:effectRef>
+          <a:fontRef idx="minor">
+            <a:schemeClr val="lt1"/>
+          </a:fontRef>
+        </p:style>
+        <p:txBody>
+          <a:bodyPr rtlCol="0" anchor="ctr"/>
+          <a:lstStyle/>
+          <a:p>
+            <a:pPr algn="ctr"/>
+            <a:endParaRPr lang="en-SG"/>
+          </a:p>
+        </p:txBody>
+      </p:sp>
+      <p:sp>
+        <p:nvSpPr>
+          <p:cNvPr id="137" name="Isosceles Triangle 136"/>
+          <p:cNvSpPr/>
+          <p:nvPr/>
+        </p:nvSpPr>
+        <p:spPr>
+          <a:xfrm rot="5400000">
+            <a:off x="5312921" y="4260496"/>
+            <a:ext cx="226423" cy="184888"/>
+          </a:xfrm>
+          <a:prstGeom prst="triangle">
+            <a:avLst/>
+          </a:prstGeom>
+          <a:solidFill>
+            <a:srgbClr val="FFFF00"/>
+          </a:solidFill>
+        </p:spPr>
+        <p:style>
+          <a:lnRef idx="2">
+            <a:schemeClr val="accent1">
+              <a:shade val="50000"/>
+            </a:schemeClr>
+          </a:lnRef>
+          <a:fillRef idx="1">
+            <a:schemeClr val="accent1"/>
+          </a:fillRef>
+          <a:effectRef idx="0">
+            <a:schemeClr val="accent1"/>
+          </a:effectRef>
+          <a:fontRef idx="minor">
+            <a:schemeClr val="lt1"/>
+          </a:fontRef>
+        </p:style>
+        <p:txBody>
+          <a:bodyPr rtlCol="0" anchor="ctr"/>
+          <a:lstStyle/>
+          <a:p>
+            <a:pPr algn="ctr"/>
+            <a:endParaRPr lang="en-SG"/>
+          </a:p>
+        </p:txBody>
+      </p:sp>
+      <p:sp>
+        <p:nvSpPr>
+          <p:cNvPr id="141" name="Isosceles Triangle 140"/>
+          <p:cNvSpPr/>
+          <p:nvPr/>
+        </p:nvSpPr>
+        <p:spPr>
+          <a:xfrm rot="5400000">
+            <a:off x="3677925" y="4243073"/>
+            <a:ext cx="226423" cy="184888"/>
+          </a:xfrm>
+          <a:prstGeom prst="triangle">
+            <a:avLst/>
+          </a:prstGeom>
+          <a:solidFill>
+            <a:srgbClr val="FFFF00"/>
+          </a:solidFill>
+        </p:spPr>
+        <p:style>
+          <a:lnRef idx="2">
+            <a:schemeClr val="accent1">
+              <a:shade val="50000"/>
+            </a:schemeClr>
+          </a:lnRef>
+          <a:fillRef idx="1">
+            <a:schemeClr val="accent1"/>
+          </a:fillRef>
+          <a:effectRef idx="0">
+            <a:schemeClr val="accent1"/>
+          </a:effectRef>
+          <a:fontRef idx="minor">
+            <a:schemeClr val="lt1"/>
+          </a:fontRef>
+        </p:style>
+        <p:txBody>
+          <a:bodyPr rtlCol="0" anchor="ctr"/>
+          <a:lstStyle/>
+          <a:p>
+            <a:pPr algn="ctr"/>
+            <a:endParaRPr lang="en-SG"/>
+          </a:p>
+        </p:txBody>
+      </p:sp>
+      <p:sp>
+        <p:nvSpPr>
+          <p:cNvPr id="145" name="TextBox 144"/>
+          <p:cNvSpPr txBox="1"/>
+          <p:nvPr/>
+        </p:nvSpPr>
+        <p:spPr>
+          <a:xfrm>
+            <a:off x="3805916" y="3957219"/>
+            <a:ext cx="662361" cy="215444"/>
+          </a:xfrm>
+          <a:prstGeom prst="rect">
+            <a:avLst/>
+          </a:prstGeom>
+          <a:noFill/>
+        </p:spPr>
+        <p:txBody>
+          <a:bodyPr wrap="none" rtlCol="0">
+            <a:spAutoFit/>
+          </a:bodyPr>
+          <a:lstStyle/>
+          <a:p>
+            <a:r>
+              <a:rPr lang="en-US" sz="800" dirty="0"/>
+              <a:t>EPA4: Filter</a:t>
+            </a:r>
+            <a:endParaRPr lang="en-SG" sz="800" dirty="0"/>
+          </a:p>
+        </p:txBody>
+      </p:sp>
+      <p:sp>
+        <p:nvSpPr>
+          <p:cNvPr id="146" name="Rectangle 145"/>
+          <p:cNvSpPr/>
+          <p:nvPr/>
+        </p:nvSpPr>
+        <p:spPr>
+          <a:xfrm>
+            <a:off x="7328203" y="4093766"/>
+            <a:ext cx="1326513" cy="507831"/>
+          </a:xfrm>
+          <a:prstGeom prst="rect">
+            <a:avLst/>
+          </a:prstGeom>
+        </p:spPr>
+        <p:txBody>
+          <a:bodyPr wrap="square">
+            <a:spAutoFit/>
+          </a:bodyPr>
+          <a:lstStyle/>
+          <a:p>
+            <a:r>
+              <a:rPr lang="en-SG" sz="900" dirty="0"/>
+              <a:t>message  =  “Heavy rain in” Area. “Drive with caution”</a:t>
+            </a:r>
+          </a:p>
+        </p:txBody>
+      </p:sp>
+      <p:sp>
+        <p:nvSpPr>
+          <p:cNvPr id="147" name="Rectangle: Rounded Corners 146"/>
+          <p:cNvSpPr/>
+          <p:nvPr/>
+        </p:nvSpPr>
+        <p:spPr>
+          <a:xfrm>
+            <a:off x="7221099" y="3953733"/>
+            <a:ext cx="1632857" cy="785698"/>
+          </a:xfrm>
+          <a:prstGeom prst="roundRect">
+            <a:avLst/>
+          </a:prstGeom>
+          <a:noFill/>
+        </p:spPr>
+        <p:style>
+          <a:lnRef idx="2">
+            <a:schemeClr val="accent1">
+              <a:shade val="50000"/>
+            </a:schemeClr>
+          </a:lnRef>
+          <a:fillRef idx="1">
+            <a:schemeClr val="accent1"/>
+          </a:fillRef>
+          <a:effectRef idx="0">
+            <a:schemeClr val="accent1"/>
+          </a:effectRef>
+          <a:fontRef idx="minor">
+            <a:schemeClr val="lt1"/>
+          </a:fontRef>
+        </p:style>
+        <p:txBody>
+          <a:bodyPr rtlCol="0" anchor="ctr"/>
+          <a:lstStyle/>
+          <a:p>
+            <a:pPr algn="ctr"/>
+            <a:endParaRPr lang="en-SG"/>
+          </a:p>
+        </p:txBody>
+      </p:sp>
+      <p:sp>
+        <p:nvSpPr>
+          <p:cNvPr id="149" name="Isosceles Triangle 148"/>
+          <p:cNvSpPr/>
+          <p:nvPr/>
+        </p:nvSpPr>
+        <p:spPr>
+          <a:xfrm rot="5400000">
+            <a:off x="8748304" y="4260496"/>
+            <a:ext cx="237321" cy="184888"/>
+          </a:xfrm>
+          <a:prstGeom prst="triangle">
+            <a:avLst/>
+          </a:prstGeom>
+          <a:solidFill>
+            <a:srgbClr val="FFFF00"/>
+          </a:solidFill>
+        </p:spPr>
+        <p:style>
+          <a:lnRef idx="2">
+            <a:schemeClr val="accent1">
+              <a:shade val="50000"/>
+            </a:schemeClr>
+          </a:lnRef>
+          <a:fillRef idx="1">
+            <a:schemeClr val="accent1"/>
+          </a:fillRef>
+          <a:effectRef idx="0">
+            <a:schemeClr val="accent1"/>
+          </a:effectRef>
+          <a:fontRef idx="minor">
+            <a:schemeClr val="lt1"/>
+          </a:fontRef>
+        </p:style>
+        <p:txBody>
+          <a:bodyPr rtlCol="0" anchor="ctr"/>
+          <a:lstStyle/>
+          <a:p>
+            <a:pPr algn="ctr"/>
+            <a:endParaRPr lang="en-SG"/>
+          </a:p>
+        </p:txBody>
+      </p:sp>
+      <p:sp>
+        <p:nvSpPr>
+          <p:cNvPr id="150" name="Isosceles Triangle 149"/>
+          <p:cNvSpPr/>
+          <p:nvPr/>
+        </p:nvSpPr>
+        <p:spPr>
+          <a:xfrm rot="5400000">
+            <a:off x="7137295" y="4274883"/>
+            <a:ext cx="237321" cy="184888"/>
+          </a:xfrm>
+          <a:prstGeom prst="triangle">
+            <a:avLst/>
+          </a:prstGeom>
+          <a:solidFill>
+            <a:srgbClr val="FFFF00"/>
+          </a:solidFill>
+        </p:spPr>
+        <p:style>
+          <a:lnRef idx="2">
+            <a:schemeClr val="accent1">
+              <a:shade val="50000"/>
+            </a:schemeClr>
+          </a:lnRef>
+          <a:fillRef idx="1">
+            <a:schemeClr val="accent1"/>
+          </a:fillRef>
+          <a:effectRef idx="0">
+            <a:schemeClr val="accent1"/>
+          </a:effectRef>
+          <a:fontRef idx="minor">
+            <a:schemeClr val="lt1"/>
+          </a:fontRef>
+        </p:style>
+        <p:txBody>
+          <a:bodyPr rtlCol="0" anchor="ctr"/>
+          <a:lstStyle/>
+          <a:p>
+            <a:pPr algn="ctr"/>
+            <a:endParaRPr lang="en-SG"/>
+          </a:p>
+        </p:txBody>
+      </p:sp>
+      <p:sp>
+        <p:nvSpPr>
+          <p:cNvPr id="151" name="Isosceles Triangle 150"/>
+          <p:cNvSpPr/>
+          <p:nvPr/>
+        </p:nvSpPr>
+        <p:spPr>
+          <a:xfrm rot="5400000">
+            <a:off x="1530896" y="4245803"/>
+            <a:ext cx="226423" cy="184888"/>
+          </a:xfrm>
+          <a:prstGeom prst="triangle">
+            <a:avLst/>
+          </a:prstGeom>
+          <a:solidFill>
+            <a:srgbClr val="FFFF00"/>
+          </a:solidFill>
+        </p:spPr>
+        <p:style>
+          <a:lnRef idx="2">
+            <a:schemeClr val="accent1">
+              <a:shade val="50000"/>
+            </a:schemeClr>
+          </a:lnRef>
+          <a:fillRef idx="1">
+            <a:schemeClr val="accent1"/>
+          </a:fillRef>
+          <a:effectRef idx="0">
+            <a:schemeClr val="accent1"/>
+          </a:effectRef>
+          <a:fontRef idx="minor">
+            <a:schemeClr val="lt1"/>
+          </a:fontRef>
+        </p:style>
+        <p:txBody>
+          <a:bodyPr rtlCol="0" anchor="ctr"/>
+          <a:lstStyle/>
+          <a:p>
+            <a:pPr algn="ctr"/>
+            <a:endParaRPr lang="en-SG"/>
+          </a:p>
+        </p:txBody>
+      </p:sp>
+      <p:cxnSp>
+        <p:nvCxnSpPr>
+          <p:cNvPr id="25" name="Straight Connector 24"/>
+          <p:cNvCxnSpPr>
+            <a:stCxn id="151" idx="0"/>
+            <a:endCxn id="141" idx="3"/>
+          </p:cNvCxnSpPr>
+          <p:nvPr/>
+        </p:nvCxnSpPr>
+        <p:spPr>
+          <a:xfrm flipV="1">
+            <a:off x="1736552" y="4335518"/>
+            <a:ext cx="1962141" cy="2730"/>
+          </a:xfrm>
+          <a:prstGeom prst="line">
+            <a:avLst/>
+          </a:prstGeom>
+        </p:spPr>
+        <p:style>
+          <a:lnRef idx="1">
+            <a:schemeClr val="accent1"/>
+          </a:lnRef>
+          <a:fillRef idx="0">
+            <a:schemeClr val="accent1"/>
+          </a:fillRef>
+          <a:effectRef idx="0">
+            <a:schemeClr val="accent1"/>
+          </a:effectRef>
+          <a:fontRef idx="minor">
+            <a:schemeClr val="tx1"/>
+          </a:fontRef>
+        </p:style>
+      </p:cxnSp>
+      <p:cxnSp>
+        <p:nvCxnSpPr>
+          <p:cNvPr id="30" name="Straight Connector 29"/>
+          <p:cNvCxnSpPr>
+            <a:stCxn id="137" idx="0"/>
+            <a:endCxn id="150" idx="3"/>
+          </p:cNvCxnSpPr>
+          <p:nvPr/>
+        </p:nvCxnSpPr>
+        <p:spPr>
+          <a:xfrm>
+            <a:off x="5518577" y="4352941"/>
+            <a:ext cx="1644935" cy="14387"/>
+          </a:xfrm>
+          <a:prstGeom prst="line">
+            <a:avLst/>
+          </a:prstGeom>
+        </p:spPr>
+        <p:style>
+          <a:lnRef idx="1">
+            <a:schemeClr val="accent1"/>
+          </a:lnRef>
+          <a:fillRef idx="0">
+            <a:schemeClr val="accent1"/>
+          </a:fillRef>
+          <a:effectRef idx="0">
+            <a:schemeClr val="accent1"/>
+          </a:effectRef>
+          <a:fontRef idx="minor">
+            <a:schemeClr val="tx1"/>
+          </a:fontRef>
+        </p:style>
+      </p:cxnSp>
+      <p:cxnSp>
+        <p:nvCxnSpPr>
+          <p:cNvPr id="33" name="Connector: Elbow 32"/>
+          <p:cNvCxnSpPr>
+            <a:stCxn id="149" idx="0"/>
+            <a:endCxn id="12" idx="3"/>
+          </p:cNvCxnSpPr>
+          <p:nvPr/>
+        </p:nvCxnSpPr>
+        <p:spPr>
+          <a:xfrm flipV="1">
+            <a:off x="8959409" y="2572755"/>
+            <a:ext cx="1378653" cy="1780186"/>
+          </a:xfrm>
+          <a:prstGeom prst="bentConnector3">
+            <a:avLst>
+              <a:gd name="adj1" fmla="val 51263"/>
+            </a:avLst>
           </a:prstGeom>
           <a:ln>
             <a:tailEnd type="triangle"/>

</xml_diff>